<commit_message>
finalized the DDL part
</commit_message>
<xml_diff>
--- a/starter-template (1).pptx
+++ b/starter-template (1).pptx
@@ -3673,7 +3673,29 @@
 </p:sldLayout>
 </file>
 
-<file path=ppt/slideLayouts/slideLayout23.xml><?xml version="1.0" encoding="UTF-8" standalone="yes"?><p:sldLayout xmlns:a="http://schemas.openxmlformats.org/drawingml/2006/main" xmlns:r="http://schemas.openxmlformats.org/officeDocument/2006/relationships" xmlns:p="http://schemas.openxmlformats.org/presentationml/2006/main" xmlns:m="http://schemas.openxmlformats.org/officeDocument/2006/math" xmlns:w="http://schemas.openxmlformats.org/wordprocessingml/2006/main" matchingName="Title & Subtitle" preserve="0" showMasterPhAnim="0" type="title" userDrawn="1"><p:cSld name="TITLE"><p:spTree><p:nvGrpSpPr><p:cNvPr id="1" name=""></p:cNvPr><p:cNvGrpSpPr/><p:nvPr></p:nvPr></p:nvGrpSpPr><p:grpSpPr bwMode="auto"><a:xfrm><a:off x="0" y="0"></a:off><a:ext cx="0" cy="0"></a:ext><a:chOff x="0" y="0"></a:chOff><a:chExt cx="0" cy="0"></a:chExt></a:xfrm></p:grpSpPr><p:sp><p:nvSpPr><p:cNvPr id="124" name="Google Shape;124;p38"></p:cNvPr><p:cNvSpPr txBox="1"></p:cNvSpPr><p:nvPr><p:ph type="title"></p:ph></p:nvPr></p:nvSpPr><p:spPr bwMode="auto"><a:xfrm><a:off x="1540817" y="1689497"></a:off><a:ext cx="4690800" cy="3405000"></a:ext></a:xfrm><a:prstGeom prst="rect"><a:avLst/></a:prstGeom><a:noFill/><a:ln><a:noFill/></a:ln></p:spPr><p:txBody><a:bodyPr spcFirstLastPara="1" wrap="square" lIns="34275" tIns="34275" rIns="34275" bIns="34275" anchor="b" anchorCtr="0"><a:noAutofit/></a:bodyPr><a:lstStyle><a:lvl1pPr marL="0" marR="0" lvl="0" indent="0" algn="ctr"><a:lnSpc><a:spcPct val="100000"></a:spcPct></a:lnSpc><a:spcBef><a:spcPts val="0"></a:spcPts></a:spcBef><a:spcAft><a:spcPts val="0"></a:spcPts></a:spcAft><a:buClr><a:srgbClr val="000000"></a:srgbClr></a:buClr><a:buSzPts val="500"></a:buSzPts><a:buFont typeface="Helvetica Neue"></a:buFont><a:buNone/><a:defRPr sz="4200" b="0" i="0" u="none" strike="noStrike" cap="none"><a:solidFill><a:srgbClr val="000000"></a:srgbClr></a:solidFill><a:latin typeface="Helvetica Neue"></a:latin><a:ea typeface="Helvetica Neue"></a:ea><a:cs typeface="Helvetica Neue"></a:cs></a:defRPr></a:lvl1pPr><a:lvl2pPr marL="0" marR="0" lvl="1" indent="88900" algn="ctr"><a:lnSpc><a:spcPct val="100000"></a:spcPct></a:lnSpc><a:spcBef><a:spcPts val="0"></a:spcPts></a:spcBef><a:spcAft><a:spcPts val="0"></a:spcPts></a:spcAft><a:buClr><a:srgbClr val="000000"></a:srgbClr></a:buClr><a:buSzPts val="500"></a:buSzPts><a:buFont typeface="Helvetica Neue"></a:buFont><a:buNone/><a:defRPr sz="4200" b="0" i="0" u="none" strike="noStrike" cap="none"><a:solidFill><a:srgbClr val="000000"></a:srgbClr></a:solidFill><a:latin typeface="Helvetica Neue"></a:latin><a:ea typeface="Helvetica Neue"></a:ea><a:cs typeface="Helvetica Neue"></a:cs></a:defRPr></a:lvl2pPr><a:lvl3pPr marL="0" marR="0" lvl="2" indent="177800" algn="ctr"><a:lnSpc><a:spcPct val="100000"></a:spcPct></a:lnSpc><a:spcBef><a:spcPts val="0"></a:spcPts></a:spcBef><a:spcAft><a:spcPts val="0"></a:spcPts></a:spcAft><a:buClr><a:srgbClr val="000000"></a:srgbClr></a:buClr><a:buSzPts val="500"></a:buSzPts><a:buFont typeface="Helvetica Neue"></a:buFont><a:buNone/><a:defRPr sz="4200" b="0" i="0" u="none" strike="noStrike" cap="none"><a:solidFill><a:srgbClr val="000000"></a:srgbClr></a:solidFill><a:latin typeface="Helvetica Neue"></a:latin><a:ea typeface="Helvetica Neue"></a:ea><a:cs typeface="Helvetica Neue"></a:cs></a:defRPr></a:lvl3pPr><a:lvl4pPr marL="0" marR="0" lvl="3" indent="254000" algn="ctr"><a:lnSpc><a:spcPct val="100000"></a:spcPct></a:lnSpc><a:spcBef><a:spcPts val="0"></a:spcPts></a:spcBef><a:spcAft><a:spcPts val="0"></a:spcPts></a:spcAft><a:buClr><a:srgbClr val="000000"></a:srgbClr></a:buClr><a:buSzPts val="500"></a:buSzPts><a:buFont typeface="Helvetica Neue"></a:buFont><a:buNone/><a:defRPr sz="4200" b="0" i="0" u="none" strike="noStrike" cap="none"><a:solidFill><a:srgbClr val="000000"></a:srgbClr></a:solidFill><a:latin typeface="Helvetica Neue"></a:latin><a:ea typeface="Helvetica Neue"></a:ea><a:cs typeface="Helvetica Neue"></a:cs></a:defRPr></a:lvl4pPr><a:lvl5pPr marL="0" marR="0" lvl="4" indent="342900" algn="ctr"><a:lnSpc><a:spcPct val="100000"></a:spcPct></a:lnSpc><a:spcBef><a:spcPts val="0"></a:spcPts></a:spcBef><a:spcAft><a:spcPts val="0"></a:spcPts></a:spcAft><a:buClr><a:srgbClr val="000000"></a:srgbClr></a:buClr><a:buSzPts val="500"></a:buSzPts><a:buFont typeface="Helvetica Neue"></a:buFont><a:buNone/><a:defRPr sz="4200" b="0" i="0" u="none" strike="noStrike" cap="none"><a:solidFill><a:srgbClr val="000000"></a:srgbClr></a:solidFill><a:latin typeface="Helvetica Neue"></a:latin><a:ea typeface="Helvetica Neue"></a:ea><a:cs typeface="Helvetica Neue"></a:cs></a:defRPr></a:lvl5pPr><a:lvl6pPr marL="0" marR="0" lvl="5" indent="431799" algn="ctr"><a:lnSpc><a:spcPct val="100000"></a:spcPct></a:lnSpc><a:spcBef><a:spcPts val="0"></a:spcPts></a:spcBef><a:spcAft><a:spcPts val="0"></a:spcPts></a:spcAft><a:buClr><a:srgbClr val="000000"></a:srgbClr></a:buClr><a:buSzPts val="500"></a:buSzPts><a:buFont typeface="Helvetica Neue"></a:buFont><a:buNone/><a:defRPr sz="4200" b="0" i="0" u="none" strike="noStrike" cap="none"><a:solidFill><a:srgbClr val="000000"></a:srgbClr></a:solidFill><a:latin typeface="Helvetica Neue"></a:latin><a:ea typeface="Helvetica Neue"></a:ea><a:cs typeface="Helvetica Neue"></a:cs></a:defRPr></a:lvl6pPr><a:lvl7pPr marL="0" marR="0" lvl="6" indent="520700" algn="ctr"><a:lnSpc><a:spcPct val="100000"></a:spcPct></a:lnSpc><a:spcBef><a:spcPts val="0"></a:spcPts></a:spcBef><a:spcAft><a:spcPts val="0"></a:spcPts></a:spcAft><a:buClr><a:srgbClr val="000000"></a:srgbClr></a:buClr><a:buSzPts val="500"></a:buSzPts><a:buFont typeface="Helvetica Neue"></a:buFont><a:buNone/><a:defRPr sz="4200" b="0" i="0" u="none" strike="noStrike" cap="none"><a:solidFill><a:srgbClr val="000000"></a:srgbClr></a:solidFill><a:latin typeface="Helvetica Neue"></a:latin><a:ea typeface="Helvetica Neue"></a:ea><a:cs typeface="Helvetica Neue"></a:cs></a:defRPr></a:lvl7pPr><a:lvl8pPr marL="0" marR="0" lvl="7" indent="596900" algn="ctr"><a:lnSpc><a:spcPct val="100000"></a:spcPct></a:lnSpc><a:spcBef><a:spcPts val="0"></a:spcPts></a:spcBef><a:spcAft><a:spcPts val="0"></a:spcPts></a:spcAft><a:buClr><a:srgbClr val="000000"></a:srgbClr></a:buClr><a:buSzPts val="500"></a:buSzPts><a:buFont typeface="Helvetica Neue"></a:buFont><a:buNone/><a:defRPr sz="4200" b="0" i="0" u="none" strike="noStrike" cap="none"><a:solidFill><a:srgbClr val="000000"></a:srgbClr></a:solidFill><a:latin typeface="Helvetica Neue"></a:latin><a:ea typeface="Helvetica Neue"></a:ea><a:cs typeface="Helvetica Neue"></a:cs></a:defRPr></a:lvl8pPr><a:lvl9pPr marL="0" marR="0" lvl="8" indent="685800" algn="ctr"><a:lnSpc><a:spcPct val="100000"></a:spcPct></a:lnSpc><a:spcBef><a:spcPts val="0"></a:spcPts></a:spcBef><a:spcAft><a:spcPts val="0"></a:spcPts></a:spcAft><a:buClr><a:srgbClr val="000000"></a:srgbClr></a:buClr><a:buSzPts val="500"></a:buSzPts><a:buFont typeface="Helvetica Neue"></a:buFont><a:buNone/><a:defRPr sz="4200" b="0" i="0" u="none" strike="noStrike" cap="none"><a:solidFill><a:srgbClr val="000000"></a:srgbClr></a:solidFill><a:latin typeface="Helvetica Neue"></a:latin><a:ea typeface="Helvetica Neue"></a:ea><a:cs typeface="Helvetica Neue"></a:cs></a:defRPr></a:lvl9pPr></a:lstStyle><a:p><a:pPr><a:defRPr></a:defRPr></a:pPr><a:endParaRPr></a:endParaRPr></a:p></p:txBody></p:sp><p:sp><p:nvSpPr><p:cNvPr id="125" name="Google Shape;125;p38"></p:cNvPr><p:cNvSpPr txBox="1"></p:cNvSpPr><p:nvPr><p:ph type="body" idx="1"></p:ph></p:nvPr></p:nvSpPr><p:spPr bwMode="auto"><a:xfrm><a:off x="1540817" y="5186362"></a:off><a:ext cx="4690800" cy="1165800"></a:ext></a:xfrm><a:prstGeom prst="rect"><a:avLst/></a:prstGeom><a:noFill/><a:ln><a:noFill/></a:ln></p:spPr><p:txBody><a:bodyPr spcFirstLastPara="1" wrap="square" lIns="34275" tIns="34275" rIns="34275" bIns="34275" anchor="t" anchorCtr="0"><a:noAutofit/></a:bodyPr><a:lstStyle><a:lvl1pPr marL="457200" marR="0" lvl="0" indent="-228600" algn="ctr"><a:lnSpc><a:spcPct val="100000"></a:spcPct></a:lnSpc><a:spcBef><a:spcPts val="0"></a:spcPts></a:spcBef><a:spcAft><a:spcPts val="0"></a:spcPts></a:spcAft><a:buClr><a:srgbClr val="000000"></a:srgbClr></a:buClr><a:buSzPts val="1400"></a:buSzPts><a:buFont typeface="Helvetica Neue"></a:buFont><a:buNone/><a:defRPr sz="1700" b="0" i="0" u="none" strike="noStrike" cap="none"><a:solidFill><a:srgbClr val="000000"></a:srgbClr></a:solidFill><a:latin typeface="Helvetica Neue"></a:latin><a:ea typeface="Helvetica Neue"></a:ea><a:cs typeface="Helvetica Neue"></a:cs></a:defRPr></a:lvl1pPr><a:lvl2pPr marL="914400" marR="0" lvl="1" indent="-228600" algn="ctr"><a:lnSpc><a:spcPct val="100000"></a:spcPct></a:lnSpc><a:spcBef><a:spcPts val="0"></a:spcPts></a:spcBef><a:spcAft><a:spcPts val="0"></a:spcPts></a:spcAft><a:buClr><a:srgbClr val="000000"></a:srgbClr></a:buClr><a:buSzPts val="1400"></a:buSzPts><a:buFont typeface="Helvetica Neue"></a:buFont><a:buNone/><a:defRPr sz="1700" b="0" i="0" u="none" strike="noStrike" cap="none"><a:solidFill><a:srgbClr val="000000"></a:srgbClr></a:solidFill><a:latin typeface="Helvetica Neue"></a:latin><a:ea typeface="Helvetica Neue"></a:ea><a:cs typeface="Helvetica Neue"></a:cs></a:defRPr></a:lvl2pPr><a:lvl3pPr marL="1371600" marR="0" lvl="2" indent="-228600" algn="ctr"><a:lnSpc><a:spcPct val="100000"></a:spcPct></a:lnSpc><a:spcBef><a:spcPts val="0"></a:spcPts></a:spcBef><a:spcAft><a:spcPts val="0"></a:spcPts></a:spcAft><a:buClr><a:srgbClr val="000000"></a:srgbClr></a:buClr><a:buSzPts val="1400"></a:buSzPts><a:buFont typeface="Helvetica Neue"></a:buFont><a:buNone/><a:defRPr sz="1700" b="0" i="0" u="none" strike="noStrike" cap="none"><a:solidFill><a:srgbClr val="000000"></a:srgbClr></a:solidFill><a:latin typeface="Helvetica Neue"></a:latin><a:ea typeface="Helvetica Neue"></a:ea><a:cs typeface="Helvetica Neue"></a:cs></a:defRPr></a:lvl3pPr><a:lvl4pPr marL="1828800" marR="0" lvl="3" indent="-228600" algn="ctr"><a:lnSpc><a:spcPct val="100000"></a:spcPct></a:lnSpc><a:spcBef><a:spcPts val="0"></a:spcPts></a:spcBef><a:spcAft><a:spcPts val="0"></a:spcPts></a:spcAft><a:buClr><a:srgbClr val="000000"></a:srgbClr></a:buClr><a:buSzPts val="1400"></a:buSzPts><a:buFont typeface="Helvetica Neue"></a:buFont><a:buNone/><a:defRPr sz="1700" b="0" i="0" u="none" strike="noStrike" cap="none"><a:solidFill><a:srgbClr val="000000"></a:srgbClr></a:solidFill><a:latin typeface="Helvetica Neue"></a:latin><a:ea typeface="Helvetica Neue"></a:ea><a:cs typeface="Helvetica Neue"></a:cs></a:defRPr></a:lvl4pPr><a:lvl5pPr marL="2286000" marR="0" lvl="4" indent="-228600" algn="ctr"><a:lnSpc><a:spcPct val="100000"></a:spcPct></a:lnSpc><a:spcBef><a:spcPts val="0"></a:spcPts></a:spcBef><a:spcAft><a:spcPts val="0"></a:spcPts></a:spcAft><a:buClr><a:srgbClr val="000000"></a:srgbClr></a:buClr><a:buSzPts val="1400"></a:buSzPts><a:buFont typeface="Helvetica Neue"></a:buFont><a:buNone/><a:defRPr sz="1700" b="0" i="0" u="none" strike="noStrike" cap="none"><a:solidFill><a:srgbClr val="000000"></a:srgbClr></a:solidFill><a:latin typeface="Helvetica Neue"></a:latin><a:ea typeface="Helvetica Neue"></a:ea><a:cs typeface="Helvetica Neue"></a:cs></a:defRPr></a:lvl5pPr><a:lvl6pPr marL="2743200" marR="0" lvl="5" indent="-317500" algn="l"><a:lnSpc><a:spcPct val="100000"></a:spcPct></a:lnSpc><a:spcBef><a:spcPts val="2200"></a:spcPts></a:spcBef><a:spcAft><a:spcPts val="0"></a:spcPts></a:spcAft><a:buClr><a:srgbClr val="000000"></a:srgbClr></a:buClr><a:buSzPts val="1400"></a:buSzPts><a:buFont typeface="Helvetica Neue"></a:buFont><a:buChar char="•"></a:buChar><a:defRPr sz="1900" b="0" i="0" u="none" strike="noStrike" cap="none"><a:solidFill><a:srgbClr val="000000"></a:srgbClr></a:solidFill><a:latin typeface="Helvetica Neue"></a:latin><a:ea typeface="Helvetica Neue"></a:ea><a:cs typeface="Helvetica Neue"></a:cs></a:defRPr></a:lvl6pPr><a:lvl7pPr marL="3200400" marR="0" lvl="6" indent="-317500" algn="l"><a:lnSpc><a:spcPct val="100000"></a:spcPct></a:lnSpc><a:spcBef><a:spcPts val="2200"></a:spcPts></a:spcBef><a:spcAft><a:spcPts val="0"></a:spcPts></a:spcAft><a:buClr><a:srgbClr val="000000"></a:srgbClr></a:buClr><a:buSzPts val="1400"></a:buSzPts><a:buFont typeface="Helvetica Neue"></a:buFont><a:buChar char="•"></a:buChar><a:defRPr sz="1900" b="0" i="0" u="none" strike="noStrike" cap="none"><a:solidFill><a:srgbClr val="000000"></a:srgbClr></a:solidFill><a:latin typeface="Helvetica Neue"></a:latin><a:ea typeface="Helvetica Neue"></a:ea><a:cs typeface="Helvetica Neue"></a:cs></a:defRPr></a:lvl7pPr><a:lvl8pPr marL="3657600" marR="0" lvl="7" indent="-317500" algn="l"><a:lnSpc><a:spcPct val="100000"></a:spcPct></a:lnSpc><a:spcBef><a:spcPts val="2200"></a:spcPts></a:spcBef><a:spcAft><a:spcPts val="0"></a:spcPts></a:spcAft><a:buClr><a:srgbClr val="000000"></a:srgbClr></a:buClr><a:buSzPts val="1400"></a:buSzPts><a:buFont typeface="Helvetica Neue"></a:buFont><a:buChar char="•"></a:buChar><a:defRPr sz="1900" b="0" i="0" u="none" strike="noStrike" cap="none"><a:solidFill><a:srgbClr val="000000"></a:srgbClr></a:solidFill><a:latin typeface="Helvetica Neue"></a:latin><a:ea typeface="Helvetica Neue"></a:ea><a:cs typeface="Helvetica Neue"></a:cs></a:defRPr></a:lvl8pPr><a:lvl9pPr marL="4114800" marR="0" lvl="8" indent="-317500" algn="l"><a:lnSpc><a:spcPct val="100000"></a:spcPct></a:lnSpc><a:spcBef><a:spcPts val="2200"></a:spcPts></a:spcBef><a:spcAft><a:spcPts val="0"></a:spcPts></a:spcAft><a:buClr><a:srgbClr val="000000"></a:srgbClr></a:buClr><a:buSzPts val="1400"></a:buSzPts><a:buFont typeface="Helvetica Neue"></a:buFont><a:buChar char="•"></a:buChar><a:defRPr sz="1900" b="0" i="0" u="none" strike="noStrike" cap="none"><a:solidFill><a:srgbClr val="000000"></a:srgbClr></a:solidFill><a:latin typeface="Helvetica Neue"></a:latin><a:ea typeface="Helvetica Neue"></a:ea><a:cs typeface="Helvetica Neue"></a:cs></a:defRPr></a:lvl9pPr></a:lstStyle><a:p><a:pPr><a:defRPr></a:defRPr></a:pPr><a:endParaRPr></a:endParaRPr></a:p></p:txBody></p:sp><p:sp><p:nvSpPr><p:cNvPr id="126" name="Google Shape;126;p38"></p:cNvPr><p:cNvSpPr txBox="1"></p:cNvSpPr><p:nvPr><p:ph type="sldNum" idx="12"></p:ph></p:nvPr></p:nvSpPr><p:spPr bwMode="auto"><a:xfrm><a:off x="3804541" y="9541073"></a:off><a:ext cx="157500" cy="375000"></a:ext></a:xfrm><a:prstGeom prst="rect"><a:avLst/></a:prstGeom><a:noFill/><a:ln><a:noFill/></a:ln></p:spPr><p:txBody><a:bodyPr spcFirstLastPara="1" wrap="square" lIns="26775" tIns="26775" rIns="26775" bIns="26775" anchor="t" anchorCtr="0"><a:noAutofit/></a:bodyPr><a:lstStyle><a:lvl1pPr marL="0" marR="0" lvl="0" indent="0" algn="ctr"><a:lnSpc><a:spcPct val="100000"></a:spcPct></a:lnSpc><a:spcBef><a:spcPts val="0"></a:spcPts></a:spcBef><a:spcAft><a:spcPts val="0"></a:spcPts></a:spcAft><a:buClr><a:srgbClr val="000000"></a:srgbClr></a:buClr><a:buFont typeface="Helvetica Neue"></a:buFont><a:buNone/><a:defRPr sz="900" b="0" i="0" u="none" strike="noStrike" cap="none"><a:solidFill><a:srgbClr val="000000"></a:srgbClr></a:solidFill><a:latin typeface="Helvetica Neue"></a:latin><a:ea typeface="Helvetica Neue"></a:ea><a:cs typeface="Helvetica Neue"></a:cs></a:defRPr></a:lvl1pPr><a:lvl2pPr marL="0" marR="0" lvl="1" indent="0" algn="ctr"><a:lnSpc><a:spcPct val="100000"></a:spcPct></a:lnSpc><a:spcBef><a:spcPts val="0"></a:spcPts></a:spcBef><a:spcAft><a:spcPts val="0"></a:spcPts></a:spcAft><a:buClr><a:srgbClr val="000000"></a:srgbClr></a:buClr><a:buFont typeface="Helvetica Neue"></a:buFont><a:buNone/><a:defRPr sz="900" b="0" i="0" u="none" strike="noStrike" cap="none"><a:solidFill><a:srgbClr val="000000"></a:srgbClr></a:solidFill><a:latin typeface="Helvetica Neue"></a:latin><a:ea typeface="Helvetica Neue"></a:ea><a:cs typeface="Helvetica Neue"></a:cs></a:defRPr></a:lvl2pPr><a:lvl3pPr marL="0" marR="0" lvl="2" indent="0" algn="ctr"><a:lnSpc><a:spcPct val="100000"></a:spcPct></a:lnSpc><a:spcBef><a:spcPts val="0"></a:spcPts></a:spcBef><a:spcAft><a:spcPts val="0"></a:spcPts></a:spcAft><a:buClr><a:srgbClr val="000000"></a:srgbClr></a:buClr><a:buFont typeface="Helvetica Neue"></a:buFont><a:buNone/><a:defRPr sz="900" b="0" i="0" u="none" strike="noStrike" cap="none"><a:solidFill><a:srgbClr val="000000"></a:srgbClr></a:solidFill><a:latin typeface="Helvetica Neue"></a:latin><a:ea typeface="Helvetica Neue"></a:ea><a:cs typeface="Helvetica Neue"></a:cs></a:defRPr></a:lvl3pPr><a:lvl4pPr marL="0" marR="0" lvl="3" indent="0" algn="ctr"><a:lnSpc><a:spcPct val="100000"></a:spcPct></a:lnSpc><a:spcBef><a:spcPts val="0"></a:spcPts></a:spcBef><a:spcAft><a:spcPts val="0"></a:spcPts></a:spcAft><a:buClr><a:srgbClr val="000000"></a:srgbClr></a:buClr><a:buFont typeface="Helvetica Neue"></a:buFont><a:buNone/><a:defRPr sz="900" b="0" i="0" u="none" strike="noStrike" cap="none"><a:solidFill><a:srgbClr val="000000"></a:srgbClr></a:solidFill><a:latin typeface="Helvetica Neue"></a:latin><a:ea typeface="Helvetica Neue"></a:ea><a:cs typeface="Helvetica Neue"></a:cs></a:defRPr></a:lvl4pPr><a:lvl5pPr marL="0" marR="0" lvl="4" indent="0" algn="ctr"><a:lnSpc><a:spcPct val="100000"></a:spcPct></a:lnSpc><a:spcBef><a:spcPts val="0"></a:spcPts></a:spcBef><a:spcAft><a:spcPts val="0"></a:spcPts></a:spcAft><a:buClr><a:srgbClr val="000000"></a:srgbClr></a:buClr><a:buFont typeface="Helvetica Neue"></a:buFont><a:buNone/><a:defRPr sz="900" b="0" i="0" u="none" strike="noStrike" cap="none"><a:solidFill><a:srgbClr val="000000"></a:srgbClr></a:solidFill><a:latin typeface="Helvetica Neue"></a:latin><a:ea typeface="Helvetica Neue"></a:ea><a:cs typeface="Helvetica Neue"></a:cs></a:defRPr></a:lvl5pPr><a:lvl6pPr marL="0" marR="0" lvl="5" indent="0" algn="ctr"><a:lnSpc><a:spcPct val="100000"></a:spcPct></a:lnSpc><a:spcBef><a:spcPts val="0"></a:spcPts></a:spcBef><a:spcAft><a:spcPts val="0"></a:spcPts></a:spcAft><a:buClr><a:srgbClr val="000000"></a:srgbClr></a:buClr><a:buFont typeface="Helvetica Neue"></a:buFont><a:buNone/><a:defRPr sz="900" b="0" i="0" u="none" strike="noStrike" cap="none"><a:solidFill><a:srgbClr val="000000"></a:srgbClr></a:solidFill><a:latin typeface="Helvetica Neue"></a:latin><a:ea typeface="Helvetica Neue"></a:ea><a:cs typeface="Helvetica Neue"></a:cs></a:defRPr></a:lvl6pPr><a:lvl7pPr marL="0" marR="0" lvl="6" indent="0" algn="ctr"><a:lnSpc><a:spcPct val="100000"></a:spcPct></a:lnSpc><a:spcBef><a:spcPts val="0"></a:spcPts></a:spcBef><a:spcAft><a:spcPts val="0"></a:spcPts></a:spcAft><a:buClr><a:srgbClr val="000000"></a:srgbClr></a:buClr><a:buFont typeface="Helvetica Neue"></a:buFont><a:buNone/><a:defRPr sz="900" b="0" i="0" u="none" strike="noStrike" cap="none"><a:solidFill><a:srgbClr val="000000"></a:srgbClr></a:solidFill><a:latin typeface="Helvetica Neue"></a:latin><a:ea typeface="Helvetica Neue"></a:ea><a:cs typeface="Helvetica Neue"></a:cs></a:defRPr></a:lvl7pPr><a:lvl8pPr marL="0" marR="0" lvl="7" indent="0" algn="ctr"><a:lnSpc><a:spcPct val="100000"></a:spcPct></a:lnSpc><a:spcBef><a:spcPts val="0"></a:spcPts></a:spcBef><a:spcAft><a:spcPts val="0"></a:spcPts></a:spcAft><a:buClr><a:srgbClr val="000000"></a:srgbClr></a:buClr><a:buFont typeface="Helvetica Neue"></a:buFont><a:buNone/><a:defRPr sz="900" b="0" i="0" u="none" strike="noStrike" cap="none"><a:solidFill><a:srgbClr val="000000"></a:srgbClr></a:solidFill><a:latin typeface="Helvetica Neue"></a:latin><a:ea typeface="Helvetica Neue"></a:ea><a:cs typeface="Helvetica Neue"></a:cs></a:defRPr></a:lvl8pPr><a:lvl9pPr marL="0" marR="0" lvl="8" indent="0" algn="ctr"><a:lnSpc><a:spcPct val="100000"></a:spcPct></a:lnSpc><a:spcBef><a:spcPts val="0"></a:spcPts></a:spcBef><a:spcAft><a:spcPts val="0"></a:spcPts></a:spcAft><a:buClr><a:srgbClr val="000000"></a:srgbClr></a:buClr><a:buFont typeface="Helvetica Neue"></a:buFont><a:buNone/><a:defRPr sz="900" b="0" i="0" u="none" strike="noStrike" cap="none"><a:solidFill><a:srgbClr val="000000"></a:srgbClr></a:solidFill><a:latin typeface="Helvetica Neue"></a:latin><a:ea typeface="Helvetica Neue"></a:ea><a:cs typeface="Helvetica Neue"></a:cs></a:defRPr></a:lvl9pPr></a:lstStyle><a:p><a:pPr marL="0" lvl="0" indent="0" algn="ctr"><a:spcBef><a:spcPts val="0"></a:spcPts></a:spcBef><a:spcAft><a:spcPts val="0"></a:spcPts></a:spcAft><a:buNone/><a:defRPr></a:defRPr></a:pPr><a:fld id="{00000000-1234-1234-1234-123412341234}" type="slidenum"><a:rPr lang="en"></a:rPr><a:t></a:t></a:fld><a:endParaRPr></a:endParaRPr></a:p></p:txBody></p:sp></p:spTree></p:cSld><p:clrMapOvr><a:masterClrMapping/></p:clrMapOvr></p:sldLayout>
+<file path=ppt/slideLayouts/slideLayout23.xml><?xml version="1.0" encoding="utf-8"?>
+<p:sldLayout xmlns:a="http://schemas.openxmlformats.org/drawingml/2006/main" xmlns:r="http://schemas.openxmlformats.org/officeDocument/2006/relationships" xmlns:p="http://schemas.openxmlformats.org/presentationml/2006/main" xmlns:m="http://schemas.openxmlformats.org/officeDocument/2006/math" xmlns:w="http://schemas.openxmlformats.org/wordprocessingml/2006/main" matchingName="" preserve="0" showMasterPhAnim="0" userDrawn="1">
+  <p:cSld name="">
+    <p:spTree>
+      <p:nvGrpSpPr>
+        <p:cNvPr id="1" name=""/>
+        <p:cNvGrpSpPr/>
+        <p:nvPr/>
+      </p:nvGrpSpPr>
+      <p:grpSpPr bwMode="auto">
+        <a:xfrm>
+          <a:off x="0" y="0"/>
+          <a:ext cx="0" cy="0"/>
+          <a:chOff x="0" y="0"/>
+          <a:chExt cx="0" cy="0"/>
+        </a:xfrm>
+      </p:grpSpPr>
+    </p:spTree>
+  </p:cSld>
+  <p:clrMapOvr>
+    <a:masterClrMapping/>
+  </p:clrMapOvr>
+</p:sldLayout>
 </file>
 
 <file path=ppt/slideLayouts/slideLayout24.xml><?xml version="1.0" encoding="utf-8"?>
@@ -6904,10 +6926,54 @@
 </p:sldLayout>
 </file>
 
-<file path=ppt/slideLayouts/slideLayout28.xml><?xml version="1.0" encoding="UTF-8" standalone="yes"?><p:sldLayout xmlns:a="http://schemas.openxmlformats.org/drawingml/2006/main" xmlns:r="http://schemas.openxmlformats.org/officeDocument/2006/relationships" xmlns:p="http://schemas.openxmlformats.org/presentationml/2006/main" xmlns:m="http://schemas.openxmlformats.org/officeDocument/2006/math" xmlns:w="http://schemas.openxmlformats.org/wordprocessingml/2006/main" matchingName="Title & Bullets" preserve="0" showMasterPhAnim="0" userDrawn="1"><p:cSld name="Title &amp; Bullets"><p:spTree><p:nvGrpSpPr><p:cNvPr id="1" name=""></p:cNvPr><p:cNvGrpSpPr/><p:nvPr></p:nvPr></p:nvGrpSpPr><p:grpSpPr bwMode="auto"><a:xfrm><a:off x="0" y="0"></a:off><a:ext cx="0" cy="0"></a:ext><a:chOff x="0" y="0"></a:chOff><a:chExt cx="0" cy="0"></a:chExt></a:xfrm></p:grpSpPr><p:sp><p:nvSpPr><p:cNvPr id="144" name="Google Shape;144;p43"></p:cNvPr><p:cNvSpPr txBox="1"></p:cNvSpPr><p:nvPr><p:ph type="title"></p:ph></p:nvPr></p:nvSpPr><p:spPr bwMode="auto"><a:xfrm><a:off x="1398501" y="458391"></a:off><a:ext cx="4975200" cy="2226300"></a:ext></a:xfrm><a:prstGeom prst="rect"><a:avLst/></a:prstGeom><a:noFill/><a:ln><a:noFill/></a:ln></p:spPr><p:txBody><a:bodyPr spcFirstLastPara="1" wrap="square" lIns="34275" tIns="34275" rIns="34275" bIns="34275" anchor="ctr" anchorCtr="0"><a:noAutofit/></a:bodyPr><a:lstStyle><a:lvl1pPr marL="0" marR="0" lvl="0" indent="0" algn="ctr"><a:lnSpc><a:spcPct val="100000"></a:spcPct></a:lnSpc><a:spcBef><a:spcPts val="0"></a:spcPts></a:spcBef><a:spcAft><a:spcPts val="0"></a:spcPts></a:spcAft><a:buClr><a:srgbClr val="000000"></a:srgbClr></a:buClr><a:buSzPts val="500"></a:buSzPts><a:buFont typeface="Helvetica Neue"></a:buFont><a:buNone/><a:defRPr sz="4200" b="0" i="0" u="none" strike="noStrike" cap="none"><a:solidFill><a:srgbClr val="000000"></a:srgbClr></a:solidFill><a:latin typeface="Helvetica Neue"></a:latin><a:ea typeface="Helvetica Neue"></a:ea><a:cs typeface="Helvetica Neue"></a:cs></a:defRPr></a:lvl1pPr><a:lvl2pPr marL="0" marR="0" lvl="1" indent="88900" algn="ctr"><a:lnSpc><a:spcPct val="100000"></a:spcPct></a:lnSpc><a:spcBef><a:spcPts val="0"></a:spcPts></a:spcBef><a:spcAft><a:spcPts val="0"></a:spcPts></a:spcAft><a:buClr><a:srgbClr val="000000"></a:srgbClr></a:buClr><a:buSzPts val="500"></a:buSzPts><a:buFont typeface="Helvetica Neue"></a:buFont><a:buNone/><a:defRPr sz="4200" b="0" i="0" u="none" strike="noStrike" cap="none"><a:solidFill><a:srgbClr val="000000"></a:srgbClr></a:solidFill><a:latin typeface="Helvetica Neue"></a:latin><a:ea typeface="Helvetica Neue"></a:ea><a:cs typeface="Helvetica Neue"></a:cs></a:defRPr></a:lvl2pPr><a:lvl3pPr marL="0" marR="0" lvl="2" indent="177800" algn="ctr"><a:lnSpc><a:spcPct val="100000"></a:spcPct></a:lnSpc><a:spcBef><a:spcPts val="0"></a:spcPts></a:spcBef><a:spcAft><a:spcPts val="0"></a:spcPts></a:spcAft><a:buClr><a:srgbClr val="000000"></a:srgbClr></a:buClr><a:buSzPts val="500"></a:buSzPts><a:buFont typeface="Helvetica Neue"></a:buFont><a:buNone/><a:defRPr sz="4200" b="0" i="0" u="none" strike="noStrike" cap="none"><a:solidFill><a:srgbClr val="000000"></a:srgbClr></a:solidFill><a:latin typeface="Helvetica Neue"></a:latin><a:ea typeface="Helvetica Neue"></a:ea><a:cs typeface="Helvetica Neue"></a:cs></a:defRPr></a:lvl3pPr><a:lvl4pPr marL="0" marR="0" lvl="3" indent="254000" algn="ctr"><a:lnSpc><a:spcPct val="100000"></a:spcPct></a:lnSpc><a:spcBef><a:spcPts val="0"></a:spcPts></a:spcBef><a:spcAft><a:spcPts val="0"></a:spcPts></a:spcAft><a:buClr><a:srgbClr val="000000"></a:srgbClr></a:buClr><a:buSzPts val="500"></a:buSzPts><a:buFont typeface="Helvetica Neue"></a:buFont><a:buNone/><a:defRPr sz="4200" b="0" i="0" u="none" strike="noStrike" cap="none"><a:solidFill><a:srgbClr val="000000"></a:srgbClr></a:solidFill><a:latin typeface="Helvetica Neue"></a:latin><a:ea typeface="Helvetica Neue"></a:ea><a:cs typeface="Helvetica Neue"></a:cs></a:defRPr></a:lvl4pPr><a:lvl5pPr marL="0" marR="0" lvl="4" indent="342900" algn="ctr"><a:lnSpc><a:spcPct val="100000"></a:spcPct></a:lnSpc><a:spcBef><a:spcPts val="0"></a:spcPts></a:spcBef><a:spcAft><a:spcPts val="0"></a:spcPts></a:spcAft><a:buClr><a:srgbClr val="000000"></a:srgbClr></a:buClr><a:buSzPts val="500"></a:buSzPts><a:buFont typeface="Helvetica Neue"></a:buFont><a:buNone/><a:defRPr sz="4200" b="0" i="0" u="none" strike="noStrike" cap="none"><a:solidFill><a:srgbClr val="000000"></a:srgbClr></a:solidFill><a:latin typeface="Helvetica Neue"></a:latin><a:ea typeface="Helvetica Neue"></a:ea><a:cs typeface="Helvetica Neue"></a:cs></a:defRPr></a:lvl5pPr><a:lvl6pPr marL="0" marR="0" lvl="5" indent="431799" algn="ctr"><a:lnSpc><a:spcPct val="100000"></a:spcPct></a:lnSpc><a:spcBef><a:spcPts val="0"></a:spcPts></a:spcBef><a:spcAft><a:spcPts val="0"></a:spcPts></a:spcAft><a:buClr><a:srgbClr val="000000"></a:srgbClr></a:buClr><a:buSzPts val="500"></a:buSzPts><a:buFont typeface="Helvetica Neue"></a:buFont><a:buNone/><a:defRPr sz="4200" b="0" i="0" u="none" strike="noStrike" cap="none"><a:solidFill><a:srgbClr val="000000"></a:srgbClr></a:solidFill><a:latin typeface="Helvetica Neue"></a:latin><a:ea typeface="Helvetica Neue"></a:ea><a:cs typeface="Helvetica Neue"></a:cs></a:defRPr></a:lvl6pPr><a:lvl7pPr marL="0" marR="0" lvl="6" indent="520700" algn="ctr"><a:lnSpc><a:spcPct val="100000"></a:spcPct></a:lnSpc><a:spcBef><a:spcPts val="0"></a:spcPts></a:spcBef><a:spcAft><a:spcPts val="0"></a:spcPts></a:spcAft><a:buClr><a:srgbClr val="000000"></a:srgbClr></a:buClr><a:buSzPts val="500"></a:buSzPts><a:buFont typeface="Helvetica Neue"></a:buFont><a:buNone/><a:defRPr sz="4200" b="0" i="0" u="none" strike="noStrike" cap="none"><a:solidFill><a:srgbClr val="000000"></a:srgbClr></a:solidFill><a:latin typeface="Helvetica Neue"></a:latin><a:ea typeface="Helvetica Neue"></a:ea><a:cs typeface="Helvetica Neue"></a:cs></a:defRPr></a:lvl7pPr><a:lvl8pPr marL="0" marR="0" lvl="7" indent="596900" algn="ctr"><a:lnSpc><a:spcPct val="100000"></a:spcPct></a:lnSpc><a:spcBef><a:spcPts val="0"></a:spcPts></a:spcBef><a:spcAft><a:spcPts val="0"></a:spcPts></a:spcAft><a:buClr><a:srgbClr val="000000"></a:srgbClr></a:buClr><a:buSzPts val="500"></a:buSzPts><a:buFont typeface="Helvetica Neue"></a:buFont><a:buNone/><a:defRPr sz="4200" b="0" i="0" u="none" strike="noStrike" cap="none"><a:solidFill><a:srgbClr val="000000"></a:srgbClr></a:solidFill><a:latin typeface="Helvetica Neue"></a:latin><a:ea typeface="Helvetica Neue"></a:ea><a:cs typeface="Helvetica Neue"></a:cs></a:defRPr></a:lvl8pPr><a:lvl9pPr marL="0" marR="0" lvl="8" indent="685800" algn="ctr"><a:lnSpc><a:spcPct val="100000"></a:spcPct></a:lnSpc><a:spcBef><a:spcPts val="0"></a:spcPts></a:spcBef><a:spcAft><a:spcPts val="0"></a:spcPts></a:spcAft><a:buClr><a:srgbClr val="000000"></a:srgbClr></a:buClr><a:buSzPts val="500"></a:buSzPts><a:buFont typeface="Helvetica Neue"></a:buFont><a:buNone/><a:defRPr sz="4200" b="0" i="0" u="none" strike="noStrike" cap="none"><a:solidFill><a:srgbClr val="000000"></a:srgbClr></a:solidFill><a:latin typeface="Helvetica Neue"></a:latin><a:ea typeface="Helvetica Neue"></a:ea><a:cs typeface="Helvetica Neue"></a:cs></a:defRPr></a:lvl9pPr></a:lstStyle><a:p><a:pPr><a:defRPr></a:defRPr></a:pPr><a:endParaRPr></a:endParaRPr></a:p></p:txBody></p:sp><p:sp><p:nvSpPr><p:cNvPr id="145" name="Google Shape;145;p43"></p:cNvPr><p:cNvSpPr txBox="1"></p:cNvSpPr><p:nvPr><p:ph type="body" idx="1"></p:ph></p:nvPr></p:nvSpPr><p:spPr bwMode="auto"><a:xfrm><a:off x="1398501" y="2684858"></a:off><a:ext cx="4975200" cy="6482700"></a:ext></a:xfrm><a:prstGeom prst="rect"><a:avLst/></a:prstGeom><a:noFill/><a:ln><a:noFill/></a:ln></p:spPr><p:txBody><a:bodyPr spcFirstLastPara="1" wrap="square" lIns="34275" tIns="34275" rIns="34275" bIns="34275" anchor="ctr" anchorCtr="0"><a:noAutofit/></a:bodyPr><a:lstStyle><a:lvl1pPr marL="457200" marR="0" lvl="0" indent="-317500" algn="l"><a:lnSpc><a:spcPct val="100000"></a:spcPct></a:lnSpc><a:spcBef><a:spcPts val="2200"></a:spcPts></a:spcBef><a:spcAft><a:spcPts val="0"></a:spcPts></a:spcAft><a:buClr><a:srgbClr val="000000"></a:srgbClr></a:buClr><a:buSzPts val="1400"></a:buSzPts><a:buFont typeface="Helvetica Neue"></a:buFont><a:buChar char="•"></a:buChar><a:defRPr sz="1900" b="0" i="0" u="none" strike="noStrike" cap="none"><a:solidFill><a:srgbClr val="000000"></a:srgbClr></a:solidFill><a:latin typeface="Helvetica Neue"></a:latin><a:ea typeface="Helvetica Neue"></a:ea><a:cs typeface="Helvetica Neue"></a:cs></a:defRPr></a:lvl1pPr><a:lvl2pPr marL="914400" marR="0" lvl="1" indent="-317500" algn="l"><a:lnSpc><a:spcPct val="100000"></a:spcPct></a:lnSpc><a:spcBef><a:spcPts val="2200"></a:spcPts></a:spcBef><a:spcAft><a:spcPts val="0"></a:spcPts></a:spcAft><a:buClr><a:srgbClr val="000000"></a:srgbClr></a:buClr><a:buSzPts val="1400"></a:buSzPts><a:buFont typeface="Helvetica Neue"></a:buFont><a:buChar char="•"></a:buChar><a:defRPr sz="1900" b="0" i="0" u="none" strike="noStrike" cap="none"><a:solidFill><a:srgbClr val="000000"></a:srgbClr></a:solidFill><a:latin typeface="Helvetica Neue"></a:latin><a:ea typeface="Helvetica Neue"></a:ea><a:cs typeface="Helvetica Neue"></a:cs></a:defRPr></a:lvl2pPr><a:lvl3pPr marL="1371600" marR="0" lvl="2" indent="-317500" algn="l"><a:lnSpc><a:spcPct val="100000"></a:spcPct></a:lnSpc><a:spcBef><a:spcPts val="2200"></a:spcPts></a:spcBef><a:spcAft><a:spcPts val="0"></a:spcPts></a:spcAft><a:buClr><a:srgbClr val="000000"></a:srgbClr></a:buClr><a:buSzPts val="1400"></a:buSzPts><a:buFont typeface="Helvetica Neue"></a:buFont><a:buChar char="•"></a:buChar><a:defRPr sz="1900" b="0" i="0" u="none" strike="noStrike" cap="none"><a:solidFill><a:srgbClr val="000000"></a:srgbClr></a:solidFill><a:latin typeface="Helvetica Neue"></a:latin><a:ea typeface="Helvetica Neue"></a:ea><a:cs typeface="Helvetica Neue"></a:cs></a:defRPr></a:lvl3pPr><a:lvl4pPr marL="1828800" marR="0" lvl="3" indent="-317500" algn="l"><a:lnSpc><a:spcPct val="100000"></a:spcPct></a:lnSpc><a:spcBef><a:spcPts val="2200"></a:spcPts></a:spcBef><a:spcAft><a:spcPts val="0"></a:spcPts></a:spcAft><a:buClr><a:srgbClr val="000000"></a:srgbClr></a:buClr><a:buSzPts val="1400"></a:buSzPts><a:buFont typeface="Helvetica Neue"></a:buFont><a:buChar char="•"></a:buChar><a:defRPr sz="1900" b="0" i="0" u="none" strike="noStrike" cap="none"><a:solidFill><a:srgbClr val="000000"></a:srgbClr></a:solidFill><a:latin typeface="Helvetica Neue"></a:latin><a:ea typeface="Helvetica Neue"></a:ea><a:cs typeface="Helvetica Neue"></a:cs></a:defRPr></a:lvl4pPr><a:lvl5pPr marL="2286000" marR="0" lvl="4" indent="-317500" algn="l"><a:lnSpc><a:spcPct val="100000"></a:spcPct></a:lnSpc><a:spcBef><a:spcPts val="2200"></a:spcPts></a:spcBef><a:spcAft><a:spcPts val="0"></a:spcPts></a:spcAft><a:buClr><a:srgbClr val="000000"></a:srgbClr></a:buClr><a:buSzPts val="1400"></a:buSzPts><a:buFont typeface="Helvetica Neue"></a:buFont><a:buChar char="•"></a:buChar><a:defRPr sz="1900" b="0" i="0" u="none" strike="noStrike" cap="none"><a:solidFill><a:srgbClr val="000000"></a:srgbClr></a:solidFill><a:latin typeface="Helvetica Neue"></a:latin><a:ea typeface="Helvetica Neue"></a:ea><a:cs typeface="Helvetica Neue"></a:cs></a:defRPr></a:lvl5pPr><a:lvl6pPr marL="2743200" marR="0" lvl="5" indent="-317500" algn="l"><a:lnSpc><a:spcPct val="100000"></a:spcPct></a:lnSpc><a:spcBef><a:spcPts val="2200"></a:spcPts></a:spcBef><a:spcAft><a:spcPts val="0"></a:spcPts></a:spcAft><a:buClr><a:srgbClr val="000000"></a:srgbClr></a:buClr><a:buSzPts val="1400"></a:buSzPts><a:buFont typeface="Helvetica Neue"></a:buFont><a:buChar char="•"></a:buChar><a:defRPr sz="1900" b="0" i="0" u="none" strike="noStrike" cap="none"><a:solidFill><a:srgbClr val="000000"></a:srgbClr></a:solidFill><a:latin typeface="Helvetica Neue"></a:latin><a:ea typeface="Helvetica Neue"></a:ea><a:cs typeface="Helvetica Neue"></a:cs></a:defRPr></a:lvl6pPr><a:lvl7pPr marL="3200400" marR="0" lvl="6" indent="-317500" algn="l"><a:lnSpc><a:spcPct val="100000"></a:spcPct></a:lnSpc><a:spcBef><a:spcPts val="2200"></a:spcPts></a:spcBef><a:spcAft><a:spcPts val="0"></a:spcPts></a:spcAft><a:buClr><a:srgbClr val="000000"></a:srgbClr></a:buClr><a:buSzPts val="1400"></a:buSzPts><a:buFont typeface="Helvetica Neue"></a:buFont><a:buChar char="•"></a:buChar><a:defRPr sz="1900" b="0" i="0" u="none" strike="noStrike" cap="none"><a:solidFill><a:srgbClr val="000000"></a:srgbClr></a:solidFill><a:latin typeface="Helvetica Neue"></a:latin><a:ea typeface="Helvetica Neue"></a:ea><a:cs typeface="Helvetica Neue"></a:cs></a:defRPr></a:lvl7pPr><a:lvl8pPr marL="3657600" marR="0" lvl="7" indent="-317500" algn="l"><a:lnSpc><a:spcPct val="100000"></a:spcPct></a:lnSpc><a:spcBef><a:spcPts val="2200"></a:spcPts></a:spcBef><a:spcAft><a:spcPts val="0"></a:spcPts></a:spcAft><a:buClr><a:srgbClr val="000000"></a:srgbClr></a:buClr><a:buSzPts val="1400"></a:buSzPts><a:buFont typeface="Helvetica Neue"></a:buFont><a:buChar char="•"></a:buChar><a:defRPr sz="1900" b="0" i="0" u="none" strike="noStrike" cap="none"><a:solidFill><a:srgbClr val="000000"></a:srgbClr></a:solidFill><a:latin typeface="Helvetica Neue"></a:latin><a:ea typeface="Helvetica Neue"></a:ea><a:cs typeface="Helvetica Neue"></a:cs></a:defRPr></a:lvl8pPr><a:lvl9pPr marL="4114800" marR="0" lvl="8" indent="-317500" algn="l"><a:lnSpc><a:spcPct val="100000"></a:spcPct></a:lnSpc><a:spcBef><a:spcPts val="2200"></a:spcPts></a:spcBef><a:spcAft><a:spcPts val="0"></a:spcPts></a:spcAft><a:buClr><a:srgbClr val="000000"></a:srgbClr></a:buClr><a:buSzPts val="1400"></a:buSzPts><a:buFont typeface="Helvetica Neue"></a:buFont><a:buChar char="•"></a:buChar><a:defRPr sz="1900" b="0" i="0" u="none" strike="noStrike" cap="none"><a:solidFill><a:srgbClr val="000000"></a:srgbClr></a:solidFill><a:latin typeface="Helvetica Neue"></a:latin><a:ea typeface="Helvetica Neue"></a:ea><a:cs typeface="Helvetica Neue"></a:cs></a:defRPr></a:lvl9pPr></a:lstStyle><a:p><a:pPr><a:defRPr></a:defRPr></a:pPr><a:endParaRPr></a:endParaRPr></a:p></p:txBody></p:sp><p:sp><p:nvSpPr><p:cNvPr id="146" name="Google Shape;146;p43"></p:cNvPr><p:cNvSpPr txBox="1"></p:cNvSpPr><p:nvPr><p:ph type="sldNum" idx="12"></p:ph></p:nvPr></p:nvSpPr><p:spPr bwMode="auto"><a:xfrm><a:off x="3804541" y="9541073"></a:off><a:ext cx="157500" cy="375000"></a:ext></a:xfrm><a:prstGeom prst="rect"><a:avLst/></a:prstGeom><a:noFill/><a:ln><a:noFill/></a:ln></p:spPr><p:txBody><a:bodyPr spcFirstLastPara="1" wrap="square" lIns="26775" tIns="26775" rIns="26775" bIns="26775" anchor="t" anchorCtr="0"><a:noAutofit/></a:bodyPr><a:lstStyle><a:lvl1pPr marL="0" marR="0" lvl="0" indent="0" algn="ctr"><a:lnSpc><a:spcPct val="100000"></a:spcPct></a:lnSpc><a:spcBef><a:spcPts val="0"></a:spcPts></a:spcBef><a:spcAft><a:spcPts val="0"></a:spcPts></a:spcAft><a:buClr><a:srgbClr val="000000"></a:srgbClr></a:buClr><a:buFont typeface="Helvetica Neue"></a:buFont><a:buNone/><a:defRPr sz="900" b="0" i="0" u="none" strike="noStrike" cap="none"><a:solidFill><a:srgbClr val="000000"></a:srgbClr></a:solidFill><a:latin typeface="Helvetica Neue"></a:latin><a:ea typeface="Helvetica Neue"></a:ea><a:cs typeface="Helvetica Neue"></a:cs></a:defRPr></a:lvl1pPr><a:lvl2pPr marL="0" marR="0" lvl="1" indent="0" algn="ctr"><a:lnSpc><a:spcPct val="100000"></a:spcPct></a:lnSpc><a:spcBef><a:spcPts val="0"></a:spcPts></a:spcBef><a:spcAft><a:spcPts val="0"></a:spcPts></a:spcAft><a:buClr><a:srgbClr val="000000"></a:srgbClr></a:buClr><a:buFont typeface="Helvetica Neue"></a:buFont><a:buNone/><a:defRPr sz="900" b="0" i="0" u="none" strike="noStrike" cap="none"><a:solidFill><a:srgbClr val="000000"></a:srgbClr></a:solidFill><a:latin typeface="Helvetica Neue"></a:latin><a:ea typeface="Helvetica Neue"></a:ea><a:cs typeface="Helvetica Neue"></a:cs></a:defRPr></a:lvl2pPr><a:lvl3pPr marL="0" marR="0" lvl="2" indent="0" algn="ctr"><a:lnSpc><a:spcPct val="100000"></a:spcPct></a:lnSpc><a:spcBef><a:spcPts val="0"></a:spcPts></a:spcBef><a:spcAft><a:spcPts val="0"></a:spcPts></a:spcAft><a:buClr><a:srgbClr val="000000"></a:srgbClr></a:buClr><a:buFont typeface="Helvetica Neue"></a:buFont><a:buNone/><a:defRPr sz="900" b="0" i="0" u="none" strike="noStrike" cap="none"><a:solidFill><a:srgbClr val="000000"></a:srgbClr></a:solidFill><a:latin typeface="Helvetica Neue"></a:latin><a:ea typeface="Helvetica Neue"></a:ea><a:cs typeface="Helvetica Neue"></a:cs></a:defRPr></a:lvl3pPr><a:lvl4pPr marL="0" marR="0" lvl="3" indent="0" algn="ctr"><a:lnSpc><a:spcPct val="100000"></a:spcPct></a:lnSpc><a:spcBef><a:spcPts val="0"></a:spcPts></a:spcBef><a:spcAft><a:spcPts val="0"></a:spcPts></a:spcAft><a:buClr><a:srgbClr val="000000"></a:srgbClr></a:buClr><a:buFont typeface="Helvetica Neue"></a:buFont><a:buNone/><a:defRPr sz="900" b="0" i="0" u="none" strike="noStrike" cap="none"><a:solidFill><a:srgbClr val="000000"></a:srgbClr></a:solidFill><a:latin typeface="Helvetica Neue"></a:latin><a:ea typeface="Helvetica Neue"></a:ea><a:cs typeface="Helvetica Neue"></a:cs></a:defRPr></a:lvl4pPr><a:lvl5pPr marL="0" marR="0" lvl="4" indent="0" algn="ctr"><a:lnSpc><a:spcPct val="100000"></a:spcPct></a:lnSpc><a:spcBef><a:spcPts val="0"></a:spcPts></a:spcBef><a:spcAft><a:spcPts val="0"></a:spcPts></a:spcAft><a:buClr><a:srgbClr val="000000"></a:srgbClr></a:buClr><a:buFont typeface="Helvetica Neue"></a:buFont><a:buNone/><a:defRPr sz="900" b="0" i="0" u="none" strike="noStrike" cap="none"><a:solidFill><a:srgbClr val="000000"></a:srgbClr></a:solidFill><a:latin typeface="Helvetica Neue"></a:latin><a:ea typeface="Helvetica Neue"></a:ea><a:cs typeface="Helvetica Neue"></a:cs></a:defRPr></a:lvl5pPr><a:lvl6pPr marL="0" marR="0" lvl="5" indent="0" algn="ctr"><a:lnSpc><a:spcPct val="100000"></a:spcPct></a:lnSpc><a:spcBef><a:spcPts val="0"></a:spcPts></a:spcBef><a:spcAft><a:spcPts val="0"></a:spcPts></a:spcAft><a:buClr><a:srgbClr val="000000"></a:srgbClr></a:buClr><a:buFont typeface="Helvetica Neue"></a:buFont><a:buNone/><a:defRPr sz="900" b="0" i="0" u="none" strike="noStrike" cap="none"><a:solidFill><a:srgbClr val="000000"></a:srgbClr></a:solidFill><a:latin typeface="Helvetica Neue"></a:latin><a:ea typeface="Helvetica Neue"></a:ea><a:cs typeface="Helvetica Neue"></a:cs></a:defRPr></a:lvl6pPr><a:lvl7pPr marL="0" marR="0" lvl="6" indent="0" algn="ctr"><a:lnSpc><a:spcPct val="100000"></a:spcPct></a:lnSpc><a:spcBef><a:spcPts val="0"></a:spcPts></a:spcBef><a:spcAft><a:spcPts val="0"></a:spcPts></a:spcAft><a:buClr><a:srgbClr val="000000"></a:srgbClr></a:buClr><a:buFont typeface="Helvetica Neue"></a:buFont><a:buNone/><a:defRPr sz="900" b="0" i="0" u="none" strike="noStrike" cap="none"><a:solidFill><a:srgbClr val="000000"></a:srgbClr></a:solidFill><a:latin typeface="Helvetica Neue"></a:latin><a:ea typeface="Helvetica Neue"></a:ea><a:cs typeface="Helvetica Neue"></a:cs></a:defRPr></a:lvl7pPr><a:lvl8pPr marL="0" marR="0" lvl="7" indent="0" algn="ctr"><a:lnSpc><a:spcPct val="100000"></a:spcPct></a:lnSpc><a:spcBef><a:spcPts val="0"></a:spcPts></a:spcBef><a:spcAft><a:spcPts val="0"></a:spcPts></a:spcAft><a:buClr><a:srgbClr val="000000"></a:srgbClr></a:buClr><a:buFont typeface="Helvetica Neue"></a:buFont><a:buNone/><a:defRPr sz="900" b="0" i="0" u="none" strike="noStrike" cap="none"><a:solidFill><a:srgbClr val="000000"></a:srgbClr></a:solidFill><a:latin typeface="Helvetica Neue"></a:latin><a:ea typeface="Helvetica Neue"></a:ea><a:cs typeface="Helvetica Neue"></a:cs></a:defRPr></a:lvl8pPr><a:lvl9pPr marL="0" marR="0" lvl="8" indent="0" algn="ctr"><a:lnSpc><a:spcPct val="100000"></a:spcPct></a:lnSpc><a:spcBef><a:spcPts val="0"></a:spcPts></a:spcBef><a:spcAft><a:spcPts val="0"></a:spcPts></a:spcAft><a:buClr><a:srgbClr val="000000"></a:srgbClr></a:buClr><a:buFont typeface="Helvetica Neue"></a:buFont><a:buNone/><a:defRPr sz="900" b="0" i="0" u="none" strike="noStrike" cap="none"><a:solidFill><a:srgbClr val="000000"></a:srgbClr></a:solidFill><a:latin typeface="Helvetica Neue"></a:latin><a:ea typeface="Helvetica Neue"></a:ea><a:cs typeface="Helvetica Neue"></a:cs></a:defRPr></a:lvl9pPr></a:lstStyle><a:p><a:pPr marL="0" lvl="0" indent="0" algn="ctr"><a:spcBef><a:spcPts val="0"></a:spcPts></a:spcBef><a:spcAft><a:spcPts val="0"></a:spcPts></a:spcAft><a:buNone/><a:defRPr></a:defRPr></a:pPr><a:fld id="{00000000-1234-1234-1234-123412341234}" type="slidenum"><a:rPr lang="en"></a:rPr><a:t></a:t></a:fld><a:endParaRPr></a:endParaRPr></a:p></p:txBody></p:sp></p:spTree></p:cSld><p:clrMapOvr><a:masterClrMapping/></p:clrMapOvr></p:sldLayout>
+<file path=ppt/slideLayouts/slideLayout28.xml><?xml version="1.0" encoding="utf-8"?>
+<p:sldLayout xmlns:a="http://schemas.openxmlformats.org/drawingml/2006/main" xmlns:r="http://schemas.openxmlformats.org/officeDocument/2006/relationships" xmlns:p="http://schemas.openxmlformats.org/presentationml/2006/main" xmlns:m="http://schemas.openxmlformats.org/officeDocument/2006/math" xmlns:w="http://schemas.openxmlformats.org/wordprocessingml/2006/main" matchingName="" preserve="0" showMasterPhAnim="0" userDrawn="1">
+  <p:cSld name="">
+    <p:spTree>
+      <p:nvGrpSpPr>
+        <p:cNvPr id="1" name=""/>
+        <p:cNvGrpSpPr/>
+        <p:nvPr/>
+      </p:nvGrpSpPr>
+      <p:grpSpPr bwMode="auto">
+        <a:xfrm>
+          <a:off x="0" y="0"/>
+          <a:ext cx="0" cy="0"/>
+          <a:chOff x="0" y="0"/>
+          <a:chExt cx="0" cy="0"/>
+        </a:xfrm>
+      </p:grpSpPr>
+    </p:spTree>
+  </p:cSld>
+  <p:clrMapOvr>
+    <a:masterClrMapping/>
+  </p:clrMapOvr>
+</p:sldLayout>
 </file>
 
-<file path=ppt/slideLayouts/slideLayout29.xml><?xml version="1.0" encoding="UTF-8" standalone="yes"?><p:sldLayout xmlns:a="http://schemas.openxmlformats.org/drawingml/2006/main" xmlns:r="http://schemas.openxmlformats.org/officeDocument/2006/relationships" xmlns:p="http://schemas.openxmlformats.org/presentationml/2006/main" xmlns:m="http://schemas.openxmlformats.org/officeDocument/2006/math" xmlns:w="http://schemas.openxmlformats.org/wordprocessingml/2006/main" matchingName="Title, Bullets & Photo" preserve="0" showMasterPhAnim="0" userDrawn="1"><p:cSld name="Title, Bullets &amp; Photo"><p:spTree><p:nvGrpSpPr><p:cNvPr id="1" name=""></p:cNvPr><p:cNvGrpSpPr/><p:nvPr></p:nvPr></p:nvGrpSpPr><p:grpSpPr bwMode="auto"><a:xfrm><a:off x="0" y="0"></a:off><a:ext cx="0" cy="0"></a:ext><a:chOff x="0" y="0"></a:chOff><a:chExt cx="0" cy="0"></a:chExt></a:xfrm></p:grpSpPr><p:sp><p:nvSpPr><p:cNvPr id="148" name="Google Shape;148;p44"></p:cNvPr><p:cNvSpPr></p:cNvSpPr><p:nvPr><p:ph type="pic" idx="2"></p:ph></p:nvPr></p:nvSpPr><p:spPr bwMode="auto"><a:xfrm><a:off x="3982975" y="2684858"></a:off><a:ext cx="2391000" cy="6482700"></a:ext></a:xfrm><a:prstGeom prst="rect"><a:avLst/></a:prstGeom><a:noFill/><a:ln><a:noFill/></a:ln></p:spPr><p:txBody><a:bodyPr spcFirstLastPara="1" wrap="square" lIns="34275" tIns="34275" rIns="34275" bIns="34275" anchor="t" anchorCtr="0"><a:noAutofit/></a:bodyPr><a:lstStyle><a:lvl1pPr marL="228600" marR="0" lvl="0" indent="-228600" algn="l"><a:lnSpc><a:spcPct val="100000"></a:spcPct></a:lnSpc><a:spcBef><a:spcPts val="2200"></a:spcPts></a:spcBef><a:spcAft><a:spcPts val="0"></a:spcPts></a:spcAft><a:buClr><a:srgbClr val="000000"></a:srgbClr></a:buClr><a:buSzPts val="1400"></a:buSzPts><a:buFont typeface="Helvetica Neue"></a:buFont><a:buChar char="•"></a:buChar><a:defRPr sz="1900" b="0" i="0" u="none" strike="noStrike" cap="none"><a:solidFill><a:srgbClr val="000000"></a:srgbClr></a:solidFill><a:latin typeface="Helvetica Neue"></a:latin><a:ea typeface="Helvetica Neue"></a:ea><a:cs typeface="Helvetica Neue"></a:cs></a:defRPr></a:lvl1pPr><a:lvl2pPr marL="393700" marR="0" lvl="1" indent="-228600" algn="l"><a:lnSpc><a:spcPct val="100000"></a:spcPct></a:lnSpc><a:spcBef><a:spcPts val="2200"></a:spcPts></a:spcBef><a:spcAft><a:spcPts val="0"></a:spcPts></a:spcAft><a:buClr><a:srgbClr val="000000"></a:srgbClr></a:buClr><a:buSzPts val="1400"></a:buSzPts><a:buFont typeface="Helvetica Neue"></a:buFont><a:buChar char="•"></a:buChar><a:defRPr sz="1900" b="0" i="0" u="none" strike="noStrike" cap="none"><a:solidFill><a:srgbClr val="000000"></a:srgbClr></a:solidFill><a:latin typeface="Helvetica Neue"></a:latin><a:ea typeface="Helvetica Neue"></a:ea><a:cs typeface="Helvetica Neue"></a:cs></a:defRPr></a:lvl2pPr><a:lvl3pPr marL="558800" marR="0" lvl="2" indent="-228600" algn="l"><a:lnSpc><a:spcPct val="100000"></a:spcPct></a:lnSpc><a:spcBef><a:spcPts val="2200"></a:spcPts></a:spcBef><a:spcAft><a:spcPts val="0"></a:spcPts></a:spcAft><a:buClr><a:srgbClr val="000000"></a:srgbClr></a:buClr><a:buSzPts val="1400"></a:buSzPts><a:buFont typeface="Helvetica Neue"></a:buFont><a:buChar char="•"></a:buChar><a:defRPr sz="1900" b="0" i="0" u="none" strike="noStrike" cap="none"><a:solidFill><a:srgbClr val="000000"></a:srgbClr></a:solidFill><a:latin typeface="Helvetica Neue"></a:latin><a:ea typeface="Helvetica Neue"></a:ea><a:cs typeface="Helvetica Neue"></a:cs></a:defRPr></a:lvl3pPr><a:lvl4pPr marL="736600" marR="0" lvl="3" indent="-241300" algn="l"><a:lnSpc><a:spcPct val="100000"></a:spcPct></a:lnSpc><a:spcBef><a:spcPts val="2200"></a:spcPts></a:spcBef><a:spcAft><a:spcPts val="0"></a:spcPts></a:spcAft><a:buClr><a:srgbClr val="000000"></a:srgbClr></a:buClr><a:buSzPts val="1400"></a:buSzPts><a:buFont typeface="Helvetica Neue"></a:buFont><a:buChar char="•"></a:buChar><a:defRPr sz="1900" b="0" i="0" u="none" strike="noStrike" cap="none"><a:solidFill><a:srgbClr val="000000"></a:srgbClr></a:solidFill><a:latin typeface="Helvetica Neue"></a:latin><a:ea typeface="Helvetica Neue"></a:ea><a:cs typeface="Helvetica Neue"></a:cs></a:defRPr></a:lvl4pPr><a:lvl5pPr marL="901700" marR="0" lvl="4" indent="-228600" algn="l"><a:lnSpc><a:spcPct val="100000"></a:spcPct></a:lnSpc><a:spcBef><a:spcPts val="2200"></a:spcPts></a:spcBef><a:spcAft><a:spcPts val="0"></a:spcPts></a:spcAft><a:buClr><a:srgbClr val="000000"></a:srgbClr></a:buClr><a:buSzPts val="1400"></a:buSzPts><a:buFont typeface="Helvetica Neue"></a:buFont><a:buChar char="•"></a:buChar><a:defRPr sz="1900" b="0" i="0" u="none" strike="noStrike" cap="none"><a:solidFill><a:srgbClr val="000000"></a:srgbClr></a:solidFill><a:latin typeface="Helvetica Neue"></a:latin><a:ea typeface="Helvetica Neue"></a:ea><a:cs typeface="Helvetica Neue"></a:cs></a:defRPr></a:lvl5pPr><a:lvl6pPr marL="1066800" marR="0" lvl="5" indent="-228600" algn="l"><a:lnSpc><a:spcPct val="100000"></a:spcPct></a:lnSpc><a:spcBef><a:spcPts val="2200"></a:spcPts></a:spcBef><a:spcAft><a:spcPts val="0"></a:spcPts></a:spcAft><a:buClr><a:srgbClr val="000000"></a:srgbClr></a:buClr><a:buSzPts val="1400"></a:buSzPts><a:buFont typeface="Helvetica Neue"></a:buFont><a:buChar char="•"></a:buChar><a:defRPr sz="1900" b="0" i="0" u="none" strike="noStrike" cap="none"><a:solidFill><a:srgbClr val="000000"></a:srgbClr></a:solidFill><a:latin typeface="Helvetica Neue"></a:latin><a:ea typeface="Helvetica Neue"></a:ea><a:cs typeface="Helvetica Neue"></a:cs></a:defRPr></a:lvl6pPr><a:lvl7pPr marL="1231900" marR="0" lvl="6" indent="-228600" algn="l"><a:lnSpc><a:spcPct val="100000"></a:spcPct></a:lnSpc><a:spcBef><a:spcPts val="2200"></a:spcPts></a:spcBef><a:spcAft><a:spcPts val="0"></a:spcPts></a:spcAft><a:buClr><a:srgbClr val="000000"></a:srgbClr></a:buClr><a:buSzPts val="1400"></a:buSzPts><a:buFont typeface="Helvetica Neue"></a:buFont><a:buChar char="•"></a:buChar><a:defRPr sz="1900" b="0" i="0" u="none" strike="noStrike" cap="none"><a:solidFill><a:srgbClr val="000000"></a:srgbClr></a:solidFill><a:latin typeface="Helvetica Neue"></a:latin><a:ea typeface="Helvetica Neue"></a:ea><a:cs typeface="Helvetica Neue"></a:cs></a:defRPr></a:lvl7pPr><a:lvl8pPr marL="1397000" marR="0" lvl="7" indent="-228600" algn="l"><a:lnSpc><a:spcPct val="100000"></a:spcPct></a:lnSpc><a:spcBef><a:spcPts val="2200"></a:spcPts></a:spcBef><a:spcAft><a:spcPts val="0"></a:spcPts></a:spcAft><a:buClr><a:srgbClr val="000000"></a:srgbClr></a:buClr><a:buSzPts val="1400"></a:buSzPts><a:buFont typeface="Helvetica Neue"></a:buFont><a:buChar char="•"></a:buChar><a:defRPr sz="1900" b="0" i="0" u="none" strike="noStrike" cap="none"><a:solidFill><a:srgbClr val="000000"></a:srgbClr></a:solidFill><a:latin typeface="Helvetica Neue"></a:latin><a:ea typeface="Helvetica Neue"></a:ea><a:cs typeface="Helvetica Neue"></a:cs></a:defRPr></a:lvl8pPr><a:lvl9pPr marL="1562100" marR="0" lvl="8" indent="-228600" algn="l"><a:lnSpc><a:spcPct val="100000"></a:spcPct></a:lnSpc><a:spcBef><a:spcPts val="2200"></a:spcPts></a:spcBef><a:spcAft><a:spcPts val="0"></a:spcPts></a:spcAft><a:buClr><a:srgbClr val="000000"></a:srgbClr></a:buClr><a:buSzPts val="1400"></a:buSzPts><a:buFont typeface="Helvetica Neue"></a:buFont><a:buChar char="•"></a:buChar><a:defRPr sz="1900" b="0" i="0" u="none" strike="noStrike" cap="none"><a:solidFill><a:srgbClr val="000000"></a:srgbClr></a:solidFill><a:latin typeface="Helvetica Neue"></a:latin><a:ea typeface="Helvetica Neue"></a:ea><a:cs typeface="Helvetica Neue"></a:cs></a:defRPr></a:lvl9pPr></a:lstStyle><a:p><a:pPr><a:defRPr></a:defRPr></a:pPr><a:endParaRPr></a:endParaRPr></a:p></p:txBody></p:sp><p:sp><p:nvSpPr><p:cNvPr id="149" name="Google Shape;149;p44"></p:cNvPr><p:cNvSpPr txBox="1"></p:cNvSpPr><p:nvPr><p:ph type="title"></p:ph></p:nvPr></p:nvSpPr><p:spPr bwMode="auto"><a:xfrm><a:off x="1398501" y="458391"></a:off><a:ext cx="4975200" cy="2226300"></a:ext></a:xfrm><a:prstGeom prst="rect"><a:avLst/></a:prstGeom><a:noFill/><a:ln><a:noFill/></a:ln></p:spPr><p:txBody><a:bodyPr spcFirstLastPara="1" wrap="square" lIns="34275" tIns="34275" rIns="34275" bIns="34275" anchor="ctr" anchorCtr="0"><a:noAutofit/></a:bodyPr><a:lstStyle><a:lvl1pPr marL="0" marR="0" lvl="0" indent="0" algn="ctr"><a:lnSpc><a:spcPct val="100000"></a:spcPct></a:lnSpc><a:spcBef><a:spcPts val="0"></a:spcPts></a:spcBef><a:spcAft><a:spcPts val="0"></a:spcPts></a:spcAft><a:buClr><a:srgbClr val="000000"></a:srgbClr></a:buClr><a:buSzPts val="500"></a:buSzPts><a:buFont typeface="Helvetica Neue"></a:buFont><a:buNone/><a:defRPr sz="4200" b="0" i="0" u="none" strike="noStrike" cap="none"><a:solidFill><a:srgbClr val="000000"></a:srgbClr></a:solidFill><a:latin typeface="Helvetica Neue"></a:latin><a:ea typeface="Helvetica Neue"></a:ea><a:cs typeface="Helvetica Neue"></a:cs></a:defRPr></a:lvl1pPr><a:lvl2pPr marL="0" marR="0" lvl="1" indent="88900" algn="ctr"><a:lnSpc><a:spcPct val="100000"></a:spcPct></a:lnSpc><a:spcBef><a:spcPts val="0"></a:spcPts></a:spcBef><a:spcAft><a:spcPts val="0"></a:spcPts></a:spcAft><a:buClr><a:srgbClr val="000000"></a:srgbClr></a:buClr><a:buSzPts val="500"></a:buSzPts><a:buFont typeface="Helvetica Neue"></a:buFont><a:buNone/><a:defRPr sz="4200" b="0" i="0" u="none" strike="noStrike" cap="none"><a:solidFill><a:srgbClr val="000000"></a:srgbClr></a:solidFill><a:latin typeface="Helvetica Neue"></a:latin><a:ea typeface="Helvetica Neue"></a:ea><a:cs typeface="Helvetica Neue"></a:cs></a:defRPr></a:lvl2pPr><a:lvl3pPr marL="0" marR="0" lvl="2" indent="177800" algn="ctr"><a:lnSpc><a:spcPct val="100000"></a:spcPct></a:lnSpc><a:spcBef><a:spcPts val="0"></a:spcPts></a:spcBef><a:spcAft><a:spcPts val="0"></a:spcPts></a:spcAft><a:buClr><a:srgbClr val="000000"></a:srgbClr></a:buClr><a:buSzPts val="500"></a:buSzPts><a:buFont typeface="Helvetica Neue"></a:buFont><a:buNone/><a:defRPr sz="4200" b="0" i="0" u="none" strike="noStrike" cap="none"><a:solidFill><a:srgbClr val="000000"></a:srgbClr></a:solidFill><a:latin typeface="Helvetica Neue"></a:latin><a:ea typeface="Helvetica Neue"></a:ea><a:cs typeface="Helvetica Neue"></a:cs></a:defRPr></a:lvl3pPr><a:lvl4pPr marL="0" marR="0" lvl="3" indent="254000" algn="ctr"><a:lnSpc><a:spcPct val="100000"></a:spcPct></a:lnSpc><a:spcBef><a:spcPts val="0"></a:spcPts></a:spcBef><a:spcAft><a:spcPts val="0"></a:spcPts></a:spcAft><a:buClr><a:srgbClr val="000000"></a:srgbClr></a:buClr><a:buSzPts val="500"></a:buSzPts><a:buFont typeface="Helvetica Neue"></a:buFont><a:buNone/><a:defRPr sz="4200" b="0" i="0" u="none" strike="noStrike" cap="none"><a:solidFill><a:srgbClr val="000000"></a:srgbClr></a:solidFill><a:latin typeface="Helvetica Neue"></a:latin><a:ea typeface="Helvetica Neue"></a:ea><a:cs typeface="Helvetica Neue"></a:cs></a:defRPr></a:lvl4pPr><a:lvl5pPr marL="0" marR="0" lvl="4" indent="342900" algn="ctr"><a:lnSpc><a:spcPct val="100000"></a:spcPct></a:lnSpc><a:spcBef><a:spcPts val="0"></a:spcPts></a:spcBef><a:spcAft><a:spcPts val="0"></a:spcPts></a:spcAft><a:buClr><a:srgbClr val="000000"></a:srgbClr></a:buClr><a:buSzPts val="500"></a:buSzPts><a:buFont typeface="Helvetica Neue"></a:buFont><a:buNone/><a:defRPr sz="4200" b="0" i="0" u="none" strike="noStrike" cap="none"><a:solidFill><a:srgbClr val="000000"></a:srgbClr></a:solidFill><a:latin typeface="Helvetica Neue"></a:latin><a:ea typeface="Helvetica Neue"></a:ea><a:cs typeface="Helvetica Neue"></a:cs></a:defRPr></a:lvl5pPr><a:lvl6pPr marL="0" marR="0" lvl="5" indent="431799" algn="ctr"><a:lnSpc><a:spcPct val="100000"></a:spcPct></a:lnSpc><a:spcBef><a:spcPts val="0"></a:spcPts></a:spcBef><a:spcAft><a:spcPts val="0"></a:spcPts></a:spcAft><a:buClr><a:srgbClr val="000000"></a:srgbClr></a:buClr><a:buSzPts val="500"></a:buSzPts><a:buFont typeface="Helvetica Neue"></a:buFont><a:buNone/><a:defRPr sz="4200" b="0" i="0" u="none" strike="noStrike" cap="none"><a:solidFill><a:srgbClr val="000000"></a:srgbClr></a:solidFill><a:latin typeface="Helvetica Neue"></a:latin><a:ea typeface="Helvetica Neue"></a:ea><a:cs typeface="Helvetica Neue"></a:cs></a:defRPr></a:lvl6pPr><a:lvl7pPr marL="0" marR="0" lvl="6" indent="520700" algn="ctr"><a:lnSpc><a:spcPct val="100000"></a:spcPct></a:lnSpc><a:spcBef><a:spcPts val="0"></a:spcPts></a:spcBef><a:spcAft><a:spcPts val="0"></a:spcPts></a:spcAft><a:buClr><a:srgbClr val="000000"></a:srgbClr></a:buClr><a:buSzPts val="500"></a:buSzPts><a:buFont typeface="Helvetica Neue"></a:buFont><a:buNone/><a:defRPr sz="4200" b="0" i="0" u="none" strike="noStrike" cap="none"><a:solidFill><a:srgbClr val="000000"></a:srgbClr></a:solidFill><a:latin typeface="Helvetica Neue"></a:latin><a:ea typeface="Helvetica Neue"></a:ea><a:cs typeface="Helvetica Neue"></a:cs></a:defRPr></a:lvl7pPr><a:lvl8pPr marL="0" marR="0" lvl="7" indent="596900" algn="ctr"><a:lnSpc><a:spcPct val="100000"></a:spcPct></a:lnSpc><a:spcBef><a:spcPts val="0"></a:spcPts></a:spcBef><a:spcAft><a:spcPts val="0"></a:spcPts></a:spcAft><a:buClr><a:srgbClr val="000000"></a:srgbClr></a:buClr><a:buSzPts val="500"></a:buSzPts><a:buFont typeface="Helvetica Neue"></a:buFont><a:buNone/><a:defRPr sz="4200" b="0" i="0" u="none" strike="noStrike" cap="none"><a:solidFill><a:srgbClr val="000000"></a:srgbClr></a:solidFill><a:latin typeface="Helvetica Neue"></a:latin><a:ea typeface="Helvetica Neue"></a:ea><a:cs typeface="Helvetica Neue"></a:cs></a:defRPr></a:lvl8pPr><a:lvl9pPr marL="0" marR="0" lvl="8" indent="685800" algn="ctr"><a:lnSpc><a:spcPct val="100000"></a:spcPct></a:lnSpc><a:spcBef><a:spcPts val="0"></a:spcPts></a:spcBef><a:spcAft><a:spcPts val="0"></a:spcPts></a:spcAft><a:buClr><a:srgbClr val="000000"></a:srgbClr></a:buClr><a:buSzPts val="500"></a:buSzPts><a:buFont typeface="Helvetica Neue"></a:buFont><a:buNone/><a:defRPr sz="4200" b="0" i="0" u="none" strike="noStrike" cap="none"><a:solidFill><a:srgbClr val="000000"></a:srgbClr></a:solidFill><a:latin typeface="Helvetica Neue"></a:latin><a:ea typeface="Helvetica Neue"></a:ea><a:cs typeface="Helvetica Neue"></a:cs></a:defRPr></a:lvl9pPr></a:lstStyle><a:p><a:pPr><a:defRPr></a:defRPr></a:pPr><a:endParaRPr></a:endParaRPr></a:p></p:txBody></p:sp><p:sp><p:nvSpPr><p:cNvPr id="150" name="Google Shape;150;p44"></p:cNvPr><p:cNvSpPr txBox="1"></p:cNvSpPr><p:nvPr><p:ph type="body" idx="1"></p:ph></p:nvPr></p:nvSpPr><p:spPr bwMode="auto"><a:xfrm><a:off x="1398501" y="2684858"></a:off><a:ext cx="2391000" cy="6482700"></a:ext></a:xfrm><a:prstGeom prst="rect"><a:avLst/></a:prstGeom><a:noFill/><a:ln><a:noFill/></a:ln></p:spPr><p:txBody><a:bodyPr spcFirstLastPara="1" wrap="square" lIns="34275" tIns="34275" rIns="34275" bIns="34275" anchor="ctr" anchorCtr="0"><a:noAutofit/></a:bodyPr><a:lstStyle><a:lvl1pPr marL="457200" marR="0" lvl="0" indent="-298450" algn="l"><a:lnSpc><a:spcPct val="100000"></a:spcPct></a:lnSpc><a:spcBef><a:spcPts val="1700"></a:spcPts></a:spcBef><a:spcAft><a:spcPts val="0"></a:spcPts></a:spcAft><a:buClr><a:srgbClr val="000000"></a:srgbClr></a:buClr><a:buSzPts val="1100"></a:buSzPts><a:buFont typeface="Helvetica Neue"></a:buFont><a:buChar char="•"></a:buChar><a:defRPr sz="1400" b="0" i="0" u="none" strike="noStrike" cap="none"><a:solidFill><a:srgbClr val="000000"></a:srgbClr></a:solidFill><a:latin typeface="Helvetica Neue"></a:latin><a:ea typeface="Helvetica Neue"></a:ea><a:cs typeface="Helvetica Neue"></a:cs></a:defRPr></a:lvl1pPr><a:lvl2pPr marL="914400" marR="0" lvl="1" indent="-298450" algn="l"><a:lnSpc><a:spcPct val="100000"></a:spcPct></a:lnSpc><a:spcBef><a:spcPts val="1700"></a:spcPts></a:spcBef><a:spcAft><a:spcPts val="0"></a:spcPts></a:spcAft><a:buClr><a:srgbClr val="000000"></a:srgbClr></a:buClr><a:buSzPts val="1100"></a:buSzPts><a:buFont typeface="Helvetica Neue"></a:buFont><a:buChar char="•"></a:buChar><a:defRPr sz="1400" b="0" i="0" u="none" strike="noStrike" cap="none"><a:solidFill><a:srgbClr val="000000"></a:srgbClr></a:solidFill><a:latin typeface="Helvetica Neue"></a:latin><a:ea typeface="Helvetica Neue"></a:ea><a:cs typeface="Helvetica Neue"></a:cs></a:defRPr></a:lvl2pPr><a:lvl3pPr marL="1371600" marR="0" lvl="2" indent="-298450" algn="l"><a:lnSpc><a:spcPct val="100000"></a:spcPct></a:lnSpc><a:spcBef><a:spcPts val="1700"></a:spcPts></a:spcBef><a:spcAft><a:spcPts val="0"></a:spcPts></a:spcAft><a:buClr><a:srgbClr val="000000"></a:srgbClr></a:buClr><a:buSzPts val="1100"></a:buSzPts><a:buFont typeface="Helvetica Neue"></a:buFont><a:buChar char="•"></a:buChar><a:defRPr sz="1400" b="0" i="0" u="none" strike="noStrike" cap="none"><a:solidFill><a:srgbClr val="000000"></a:srgbClr></a:solidFill><a:latin typeface="Helvetica Neue"></a:latin><a:ea typeface="Helvetica Neue"></a:ea><a:cs typeface="Helvetica Neue"></a:cs></a:defRPr></a:lvl3pPr><a:lvl4pPr marL="1828800" marR="0" lvl="3" indent="-298450" algn="l"><a:lnSpc><a:spcPct val="100000"></a:spcPct></a:lnSpc><a:spcBef><a:spcPts val="1700"></a:spcPts></a:spcBef><a:spcAft><a:spcPts val="0"></a:spcPts></a:spcAft><a:buClr><a:srgbClr val="000000"></a:srgbClr></a:buClr><a:buSzPts val="1100"></a:buSzPts><a:buFont typeface="Helvetica Neue"></a:buFont><a:buChar char="•"></a:buChar><a:defRPr sz="1400" b="0" i="0" u="none" strike="noStrike" cap="none"><a:solidFill><a:srgbClr val="000000"></a:srgbClr></a:solidFill><a:latin typeface="Helvetica Neue"></a:latin><a:ea typeface="Helvetica Neue"></a:ea><a:cs typeface="Helvetica Neue"></a:cs></a:defRPr></a:lvl4pPr><a:lvl5pPr marL="2286000" marR="0" lvl="4" indent="-298450" algn="l"><a:lnSpc><a:spcPct val="100000"></a:spcPct></a:lnSpc><a:spcBef><a:spcPts val="1700"></a:spcPts></a:spcBef><a:spcAft><a:spcPts val="0"></a:spcPts></a:spcAft><a:buClr><a:srgbClr val="000000"></a:srgbClr></a:buClr><a:buSzPts val="1100"></a:buSzPts><a:buFont typeface="Helvetica Neue"></a:buFont><a:buChar char="•"></a:buChar><a:defRPr sz="1400" b="0" i="0" u="none" strike="noStrike" cap="none"><a:solidFill><a:srgbClr val="000000"></a:srgbClr></a:solidFill><a:latin typeface="Helvetica Neue"></a:latin><a:ea typeface="Helvetica Neue"></a:ea><a:cs typeface="Helvetica Neue"></a:cs></a:defRPr></a:lvl5pPr><a:lvl6pPr marL="2743200" marR="0" lvl="5" indent="-317500" algn="l"><a:lnSpc><a:spcPct val="100000"></a:spcPct></a:lnSpc><a:spcBef><a:spcPts val="2200"></a:spcPts></a:spcBef><a:spcAft><a:spcPts val="0"></a:spcPts></a:spcAft><a:buClr><a:srgbClr val="000000"></a:srgbClr></a:buClr><a:buSzPts val="1400"></a:buSzPts><a:buFont typeface="Helvetica Neue"></a:buFont><a:buChar char="•"></a:buChar><a:defRPr sz="1900" b="0" i="0" u="none" strike="noStrike" cap="none"><a:solidFill><a:srgbClr val="000000"></a:srgbClr></a:solidFill><a:latin typeface="Helvetica Neue"></a:latin><a:ea typeface="Helvetica Neue"></a:ea><a:cs typeface="Helvetica Neue"></a:cs></a:defRPr></a:lvl6pPr><a:lvl7pPr marL="3200400" marR="0" lvl="6" indent="-317500" algn="l"><a:lnSpc><a:spcPct val="100000"></a:spcPct></a:lnSpc><a:spcBef><a:spcPts val="2200"></a:spcPts></a:spcBef><a:spcAft><a:spcPts val="0"></a:spcPts></a:spcAft><a:buClr><a:srgbClr val="000000"></a:srgbClr></a:buClr><a:buSzPts val="1400"></a:buSzPts><a:buFont typeface="Helvetica Neue"></a:buFont><a:buChar char="•"></a:buChar><a:defRPr sz="1900" b="0" i="0" u="none" strike="noStrike" cap="none"><a:solidFill><a:srgbClr val="000000"></a:srgbClr></a:solidFill><a:latin typeface="Helvetica Neue"></a:latin><a:ea typeface="Helvetica Neue"></a:ea><a:cs typeface="Helvetica Neue"></a:cs></a:defRPr></a:lvl7pPr><a:lvl8pPr marL="3657600" marR="0" lvl="7" indent="-317500" algn="l"><a:lnSpc><a:spcPct val="100000"></a:spcPct></a:lnSpc><a:spcBef><a:spcPts val="2200"></a:spcPts></a:spcBef><a:spcAft><a:spcPts val="0"></a:spcPts></a:spcAft><a:buClr><a:srgbClr val="000000"></a:srgbClr></a:buClr><a:buSzPts val="1400"></a:buSzPts><a:buFont typeface="Helvetica Neue"></a:buFont><a:buChar char="•"></a:buChar><a:defRPr sz="1900" b="0" i="0" u="none" strike="noStrike" cap="none"><a:solidFill><a:srgbClr val="000000"></a:srgbClr></a:solidFill><a:latin typeface="Helvetica Neue"></a:latin><a:ea typeface="Helvetica Neue"></a:ea><a:cs typeface="Helvetica Neue"></a:cs></a:defRPr></a:lvl8pPr><a:lvl9pPr marL="4114800" marR="0" lvl="8" indent="-317500" algn="l"><a:lnSpc><a:spcPct val="100000"></a:spcPct></a:lnSpc><a:spcBef><a:spcPts val="2200"></a:spcPts></a:spcBef><a:spcAft><a:spcPts val="0"></a:spcPts></a:spcAft><a:buClr><a:srgbClr val="000000"></a:srgbClr></a:buClr><a:buSzPts val="1400"></a:buSzPts><a:buFont typeface="Helvetica Neue"></a:buFont><a:buChar char="•"></a:buChar><a:defRPr sz="1900" b="0" i="0" u="none" strike="noStrike" cap="none"><a:solidFill><a:srgbClr val="000000"></a:srgbClr></a:solidFill><a:latin typeface="Helvetica Neue"></a:latin><a:ea typeface="Helvetica Neue"></a:ea><a:cs typeface="Helvetica Neue"></a:cs></a:defRPr></a:lvl9pPr></a:lstStyle><a:p><a:pPr><a:defRPr></a:defRPr></a:pPr><a:endParaRPr></a:endParaRPr></a:p></p:txBody></p:sp><p:sp><p:nvSpPr><p:cNvPr id="151" name="Google Shape;151;p44"></p:cNvPr><p:cNvSpPr txBox="1"></p:cNvSpPr><p:nvPr><p:ph type="sldNum" idx="12"></p:ph></p:nvPr></p:nvSpPr><p:spPr bwMode="auto"><a:xfrm><a:off x="3804541" y="9541073"></a:off><a:ext cx="157500" cy="375000"></a:ext></a:xfrm><a:prstGeom prst="rect"><a:avLst/></a:prstGeom><a:noFill/><a:ln><a:noFill/></a:ln></p:spPr><p:txBody><a:bodyPr spcFirstLastPara="1" wrap="square" lIns="26775" tIns="26775" rIns="26775" bIns="26775" anchor="t" anchorCtr="0"><a:noAutofit/></a:bodyPr><a:lstStyle><a:lvl1pPr marL="0" marR="0" lvl="0" indent="0" algn="ctr"><a:lnSpc><a:spcPct val="100000"></a:spcPct></a:lnSpc><a:spcBef><a:spcPts val="0"></a:spcPts></a:spcBef><a:spcAft><a:spcPts val="0"></a:spcPts></a:spcAft><a:buClr><a:srgbClr val="000000"></a:srgbClr></a:buClr><a:buFont typeface="Helvetica Neue"></a:buFont><a:buNone/><a:defRPr sz="900" b="0" i="0" u="none" strike="noStrike" cap="none"><a:solidFill><a:srgbClr val="000000"></a:srgbClr></a:solidFill><a:latin typeface="Helvetica Neue"></a:latin><a:ea typeface="Helvetica Neue"></a:ea><a:cs typeface="Helvetica Neue"></a:cs></a:defRPr></a:lvl1pPr><a:lvl2pPr marL="0" marR="0" lvl="1" indent="0" algn="ctr"><a:lnSpc><a:spcPct val="100000"></a:spcPct></a:lnSpc><a:spcBef><a:spcPts val="0"></a:spcPts></a:spcBef><a:spcAft><a:spcPts val="0"></a:spcPts></a:spcAft><a:buClr><a:srgbClr val="000000"></a:srgbClr></a:buClr><a:buFont typeface="Helvetica Neue"></a:buFont><a:buNone/><a:defRPr sz="900" b="0" i="0" u="none" strike="noStrike" cap="none"><a:solidFill><a:srgbClr val="000000"></a:srgbClr></a:solidFill><a:latin typeface="Helvetica Neue"></a:latin><a:ea typeface="Helvetica Neue"></a:ea><a:cs typeface="Helvetica Neue"></a:cs></a:defRPr></a:lvl2pPr><a:lvl3pPr marL="0" marR="0" lvl="2" indent="0" algn="ctr"><a:lnSpc><a:spcPct val="100000"></a:spcPct></a:lnSpc><a:spcBef><a:spcPts val="0"></a:spcPts></a:spcBef><a:spcAft><a:spcPts val="0"></a:spcPts></a:spcAft><a:buClr><a:srgbClr val="000000"></a:srgbClr></a:buClr><a:buFont typeface="Helvetica Neue"></a:buFont><a:buNone/><a:defRPr sz="900" b="0" i="0" u="none" strike="noStrike" cap="none"><a:solidFill><a:srgbClr val="000000"></a:srgbClr></a:solidFill><a:latin typeface="Helvetica Neue"></a:latin><a:ea typeface="Helvetica Neue"></a:ea><a:cs typeface="Helvetica Neue"></a:cs></a:defRPr></a:lvl3pPr><a:lvl4pPr marL="0" marR="0" lvl="3" indent="0" algn="ctr"><a:lnSpc><a:spcPct val="100000"></a:spcPct></a:lnSpc><a:spcBef><a:spcPts val="0"></a:spcPts></a:spcBef><a:spcAft><a:spcPts val="0"></a:spcPts></a:spcAft><a:buClr><a:srgbClr val="000000"></a:srgbClr></a:buClr><a:buFont typeface="Helvetica Neue"></a:buFont><a:buNone/><a:defRPr sz="900" b="0" i="0" u="none" strike="noStrike" cap="none"><a:solidFill><a:srgbClr val="000000"></a:srgbClr></a:solidFill><a:latin typeface="Helvetica Neue"></a:latin><a:ea typeface="Helvetica Neue"></a:ea><a:cs typeface="Helvetica Neue"></a:cs></a:defRPr></a:lvl4pPr><a:lvl5pPr marL="0" marR="0" lvl="4" indent="0" algn="ctr"><a:lnSpc><a:spcPct val="100000"></a:spcPct></a:lnSpc><a:spcBef><a:spcPts val="0"></a:spcPts></a:spcBef><a:spcAft><a:spcPts val="0"></a:spcPts></a:spcAft><a:buClr><a:srgbClr val="000000"></a:srgbClr></a:buClr><a:buFont typeface="Helvetica Neue"></a:buFont><a:buNone/><a:defRPr sz="900" b="0" i="0" u="none" strike="noStrike" cap="none"><a:solidFill><a:srgbClr val="000000"></a:srgbClr></a:solidFill><a:latin typeface="Helvetica Neue"></a:latin><a:ea typeface="Helvetica Neue"></a:ea><a:cs typeface="Helvetica Neue"></a:cs></a:defRPr></a:lvl5pPr><a:lvl6pPr marL="0" marR="0" lvl="5" indent="0" algn="ctr"><a:lnSpc><a:spcPct val="100000"></a:spcPct></a:lnSpc><a:spcBef><a:spcPts val="0"></a:spcPts></a:spcBef><a:spcAft><a:spcPts val="0"></a:spcPts></a:spcAft><a:buClr><a:srgbClr val="000000"></a:srgbClr></a:buClr><a:buFont typeface="Helvetica Neue"></a:buFont><a:buNone/><a:defRPr sz="900" b="0" i="0" u="none" strike="noStrike" cap="none"><a:solidFill><a:srgbClr val="000000"></a:srgbClr></a:solidFill><a:latin typeface="Helvetica Neue"></a:latin><a:ea typeface="Helvetica Neue"></a:ea><a:cs typeface="Helvetica Neue"></a:cs></a:defRPr></a:lvl6pPr><a:lvl7pPr marL="0" marR="0" lvl="6" indent="0" algn="ctr"><a:lnSpc><a:spcPct val="100000"></a:spcPct></a:lnSpc><a:spcBef><a:spcPts val="0"></a:spcPts></a:spcBef><a:spcAft><a:spcPts val="0"></a:spcPts></a:spcAft><a:buClr><a:srgbClr val="000000"></a:srgbClr></a:buClr><a:buFont typeface="Helvetica Neue"></a:buFont><a:buNone/><a:defRPr sz="900" b="0" i="0" u="none" strike="noStrike" cap="none"><a:solidFill><a:srgbClr val="000000"></a:srgbClr></a:solidFill><a:latin typeface="Helvetica Neue"></a:latin><a:ea typeface="Helvetica Neue"></a:ea><a:cs typeface="Helvetica Neue"></a:cs></a:defRPr></a:lvl7pPr><a:lvl8pPr marL="0" marR="0" lvl="7" indent="0" algn="ctr"><a:lnSpc><a:spcPct val="100000"></a:spcPct></a:lnSpc><a:spcBef><a:spcPts val="0"></a:spcPts></a:spcBef><a:spcAft><a:spcPts val="0"></a:spcPts></a:spcAft><a:buClr><a:srgbClr val="000000"></a:srgbClr></a:buClr><a:buFont typeface="Helvetica Neue"></a:buFont><a:buNone/><a:defRPr sz="900" b="0" i="0" u="none" strike="noStrike" cap="none"><a:solidFill><a:srgbClr val="000000"></a:srgbClr></a:solidFill><a:latin typeface="Helvetica Neue"></a:latin><a:ea typeface="Helvetica Neue"></a:ea><a:cs typeface="Helvetica Neue"></a:cs></a:defRPr></a:lvl8pPr><a:lvl9pPr marL="0" marR="0" lvl="8" indent="0" algn="ctr"><a:lnSpc><a:spcPct val="100000"></a:spcPct></a:lnSpc><a:spcBef><a:spcPts val="0"></a:spcPts></a:spcBef><a:spcAft><a:spcPts val="0"></a:spcPts></a:spcAft><a:buClr><a:srgbClr val="000000"></a:srgbClr></a:buClr><a:buFont typeface="Helvetica Neue"></a:buFont><a:buNone/><a:defRPr sz="900" b="0" i="0" u="none" strike="noStrike" cap="none"><a:solidFill><a:srgbClr val="000000"></a:srgbClr></a:solidFill><a:latin typeface="Helvetica Neue"></a:latin><a:ea typeface="Helvetica Neue"></a:ea><a:cs typeface="Helvetica Neue"></a:cs></a:defRPr></a:lvl9pPr></a:lstStyle><a:p><a:pPr marL="0" lvl="0" indent="0" algn="ctr"><a:spcBef><a:spcPts val="0"></a:spcPts></a:spcBef><a:spcAft><a:spcPts val="0"></a:spcPts></a:spcAft><a:buNone/><a:defRPr></a:defRPr></a:pPr><a:fld id="{00000000-1234-1234-1234-123412341234}" type="slidenum"><a:rPr lang="en"></a:rPr><a:t></a:t></a:fld><a:endParaRPr></a:endParaRPr></a:p></p:txBody></p:sp></p:spTree></p:cSld><p:clrMapOvr><a:masterClrMapping/></p:clrMapOvr></p:sldLayout>
+<file path=ppt/slideLayouts/slideLayout29.xml><?xml version="1.0" encoding="utf-8"?>
+<p:sldLayout xmlns:a="http://schemas.openxmlformats.org/drawingml/2006/main" xmlns:r="http://schemas.openxmlformats.org/officeDocument/2006/relationships" xmlns:p="http://schemas.openxmlformats.org/presentationml/2006/main" xmlns:m="http://schemas.openxmlformats.org/officeDocument/2006/math" xmlns:w="http://schemas.openxmlformats.org/wordprocessingml/2006/main" matchingName="" preserve="0" showMasterPhAnim="0" userDrawn="1">
+  <p:cSld name="">
+    <p:spTree>
+      <p:nvGrpSpPr>
+        <p:cNvPr id="1" name=""/>
+        <p:cNvGrpSpPr/>
+        <p:nvPr/>
+      </p:nvGrpSpPr>
+      <p:grpSpPr bwMode="auto">
+        <a:xfrm>
+          <a:off x="0" y="0"/>
+          <a:ext cx="0" cy="0"/>
+          <a:chOff x="0" y="0"/>
+          <a:chExt cx="0" cy="0"/>
+        </a:xfrm>
+      </p:grpSpPr>
+    </p:spTree>
+  </p:cSld>
+  <p:clrMapOvr>
+    <a:masterClrMapping/>
+  </p:clrMapOvr>
+</p:sldLayout>
 </file>
 
 <file path=ppt/slideLayouts/slideLayout3.xml><?xml version="1.0" encoding="utf-8"?>
@@ -17177,34 +17243,24 @@
       </p:sp>
       <p:pic>
         <p:nvPicPr>
-          <p:cNvPr id="250" name="Google Shape;250;p62"/>
-          <p:cNvPicPr/>
+          <p:cNvPr id="377331607" name=""/>
+          <p:cNvPicPr>
+            <a:picLocks noChangeAspect="1"/>
+          </p:cNvPicPr>
           <p:nvPr/>
         </p:nvPicPr>
         <p:blipFill>
-          <a:blip r:embed="rId2">
-            <a:alphaModFix/>
-          </a:blip>
+          <a:blip r:embed="rId2"/>
           <a:stretch/>
         </p:blipFill>
         <p:spPr bwMode="auto">
-          <a:xfrm>
-            <a:off x="755850" y="5786403"/>
-            <a:ext cx="6085425" cy="2570274"/>
+          <a:xfrm flipH="0" flipV="0">
+            <a:off x="1372972" y="5462669"/>
+            <a:ext cx="4909256" cy="4522954"/>
           </a:xfrm>
           <a:prstGeom prst="rect">
             <a:avLst/>
           </a:prstGeom>
-          <a:noFill/>
-          <a:ln w="9525" cap="flat" cmpd="sng">
-            <a:solidFill>
-              <a:schemeClr val="dk2"/>
-            </a:solidFill>
-            <a:prstDash val="solid"/>
-            <a:round/>
-            <a:headEnd type="none" w="sm" len="sm"/>
-            <a:tailEnd type="none" w="sm" len="sm"/>
-          </a:ln>
         </p:spPr>
       </p:pic>
     </p:spTree>
@@ -17555,34 +17611,24 @@
       </p:sp>
       <p:pic>
         <p:nvPicPr>
-          <p:cNvPr id="257" name="Google Shape;257;p63"/>
-          <p:cNvPicPr/>
+          <p:cNvPr id="1330369596" name=""/>
+          <p:cNvPicPr>
+            <a:picLocks noChangeAspect="1"/>
+          </p:cNvPicPr>
           <p:nvPr/>
         </p:nvPicPr>
         <p:blipFill>
-          <a:blip r:embed="rId2">
-            <a:alphaModFix/>
-          </a:blip>
+          <a:blip r:embed="rId2"/>
           <a:stretch/>
         </p:blipFill>
         <p:spPr bwMode="auto">
-          <a:xfrm>
-            <a:off x="484950" y="5969175"/>
-            <a:ext cx="6802502" cy="3038826"/>
+          <a:xfrm flipH="0" flipV="0">
+            <a:off x="750794" y="5793441"/>
+            <a:ext cx="6164974" cy="4192182"/>
           </a:xfrm>
           <a:prstGeom prst="rect">
             <a:avLst/>
           </a:prstGeom>
-          <a:noFill/>
-          <a:ln w="9525" cap="flat" cmpd="sng">
-            <a:solidFill>
-              <a:schemeClr val="dk2"/>
-            </a:solidFill>
-            <a:prstDash val="solid"/>
-            <a:round/>
-            <a:headEnd type="none" w="sm" len="sm"/>
-            <a:tailEnd type="none" w="sm" len="sm"/>
-          </a:ln>
         </p:spPr>
       </p:pic>
     </p:spTree>
@@ -17820,34 +17866,24 @@
       </p:sp>
       <p:pic>
         <p:nvPicPr>
-          <p:cNvPr id="264" name="Google Shape;264;p64"/>
-          <p:cNvPicPr/>
+          <p:cNvPr id="1682520536" name=""/>
+          <p:cNvPicPr>
+            <a:picLocks noChangeAspect="1"/>
+          </p:cNvPicPr>
           <p:nvPr/>
         </p:nvPicPr>
         <p:blipFill>
-          <a:blip r:embed="rId2">
-            <a:alphaModFix/>
-          </a:blip>
+          <a:blip r:embed="rId2"/>
           <a:stretch/>
         </p:blipFill>
         <p:spPr bwMode="auto">
-          <a:xfrm>
-            <a:off x="832174" y="5859975"/>
-            <a:ext cx="6108049" cy="3630424"/>
+          <a:xfrm flipH="0" flipV="0">
+            <a:off x="429995" y="5755271"/>
+            <a:ext cx="6912497" cy="4218194"/>
           </a:xfrm>
           <a:prstGeom prst="rect">
             <a:avLst/>
           </a:prstGeom>
-          <a:noFill/>
-          <a:ln w="9525" cap="flat" cmpd="sng">
-            <a:solidFill>
-              <a:schemeClr val="dk2"/>
-            </a:solidFill>
-            <a:prstDash val="solid"/>
-            <a:round/>
-            <a:headEnd type="none" w="sm" len="sm"/>
-            <a:tailEnd type="none" w="sm" len="sm"/>
-          </a:ln>
         </p:spPr>
       </p:pic>
     </p:spTree>
@@ -19335,35 +19371,24 @@
       </p:sp>
       <p:pic>
         <p:nvPicPr>
-          <p:cNvPr id="283" name="Google Shape;283;p67"/>
-          <p:cNvPicPr/>
+          <p:cNvPr id="1429990699" name=""/>
+          <p:cNvPicPr>
+            <a:picLocks noChangeAspect="1"/>
+          </p:cNvPicPr>
           <p:nvPr/>
         </p:nvPicPr>
         <p:blipFill>
-          <a:blip r:embed="rId2">
-            <a:alphaModFix/>
-          </a:blip>
-          <a:srcRect l="2818" t="2391" r="0" b="0"/>
+          <a:blip r:embed="rId2"/>
           <a:stretch/>
         </p:blipFill>
         <p:spPr bwMode="auto">
-          <a:xfrm>
-            <a:off x="1641775" y="5527975"/>
-            <a:ext cx="3823475" cy="3971125"/>
+          <a:xfrm flipH="0" flipV="0">
+            <a:off x="2698100" y="5277364"/>
+            <a:ext cx="2673779" cy="4708258"/>
           </a:xfrm>
           <a:prstGeom prst="rect">
             <a:avLst/>
           </a:prstGeom>
-          <a:noFill/>
-          <a:ln w="9525" cap="flat" cmpd="sng">
-            <a:solidFill>
-              <a:schemeClr val="dk2"/>
-            </a:solidFill>
-            <a:prstDash val="solid"/>
-            <a:round/>
-            <a:headEnd type="none" w="sm" len="sm"/>
-            <a:tailEnd type="none" w="sm" len="sm"/>
-          </a:ln>
         </p:spPr>
       </p:pic>
     </p:spTree>
@@ -26020,58 +26045,9 @@
             </a:pPr>
             <a:r>
               <a:rPr lang="en" sz="1700"/>
-              <a:t>List the database objects (tables, views, special procedures)  that will be created for the database. </a:t>
+              <a:t>List of database tables that will be created for this project: 1) Employee, 2) Manager, 3) Education_Level, 4) Office, 5) City, 6) Job, 7) Salary, 8) Employee_History, 9) Department</a:t>
             </a:r>
             <a:endParaRPr sz="1700"/>
-          </a:p>
-          <a:p>
-            <a:pPr marL="457200" lvl="0" indent="0" algn="l">
-              <a:lnSpc>
-                <a:spcPct val="100000"/>
-              </a:lnSpc>
-              <a:spcBef>
-                <a:spcPts val="0"/>
-              </a:spcBef>
-              <a:spcAft>
-                <a:spcPts val="0"/>
-              </a:spcAft>
-              <a:buNone/>
-              <a:defRPr/>
-            </a:pPr>
-            <a:endParaRPr sz="1700"/>
-          </a:p>
-          <a:p>
-            <a:pPr marL="457200" lvl="0" indent="0" algn="l">
-              <a:lnSpc>
-                <a:spcPct val="100000"/>
-              </a:lnSpc>
-              <a:spcBef>
-                <a:spcPts val="0"/>
-              </a:spcBef>
-              <a:spcAft>
-                <a:spcPts val="0"/>
-              </a:spcAft>
-              <a:buNone/>
-              <a:defRPr/>
-            </a:pPr>
-            <a:r>
-              <a:rPr lang="en" sz="1700"/>
-              <a:t>Hint - you may want to circle back to this answer after completing the logical ERD in step 2.</a:t>
-            </a:r>
-            <a:endParaRPr sz="1700"/>
-          </a:p>
-          <a:p>
-            <a:pPr marL="457200" lvl="0" indent="0" algn="l">
-              <a:spcBef>
-                <a:spcPts val="0"/>
-              </a:spcBef>
-              <a:spcAft>
-                <a:spcPts val="0"/>
-              </a:spcAft>
-              <a:buNone/>
-              <a:defRPr/>
-            </a:pPr>
-            <a:endParaRPr sz="1900"/>
           </a:p>
           <a:p>
             <a:pPr marL="457200" lvl="0" indent="-349250" algn="l">
@@ -26121,7 +26097,7 @@
             </a:pPr>
             <a:r>
               <a:rPr lang="en" sz="1700"/>
-              <a:t>Select a data ingestion method (ETL, Direct feed, API) based on the information provided. </a:t>
+              <a:t>API is a chosen method for interfacing with the payroll management system. APIs provide with clearly defined interfaces and establishesh concrete system boundaries.</a:t>
             </a:r>
             <a:endParaRPr sz="1900"/>
           </a:p>
@@ -26170,7 +26146,7 @@
         </p:nvSpPr>
         <p:spPr bwMode="auto">
           <a:xfrm>
-            <a:off x="264945" y="870271"/>
+            <a:off x="264949" y="310320"/>
             <a:ext cx="7242600" cy="1119900"/>
           </a:xfrm>
           <a:prstGeom prst="rect">
@@ -26219,7 +26195,7 @@
         </p:nvSpPr>
         <p:spPr bwMode="auto">
           <a:xfrm>
-            <a:off x="264950" y="2253724"/>
+            <a:off x="264949" y="1638346"/>
             <a:ext cx="7242600" cy="7731900"/>
           </a:xfrm>
           <a:prstGeom prst="rect">
@@ -26281,10 +26257,22 @@
               <a:t>Ownership: </a:t>
             </a:r>
             <a:r>
-              <a:rPr lang="en" sz="1700"/>
-              <a:t>who will own and maintain the data</a:t>
+              <a:rPr lang="en" sz="1400" b="0">
+                <a:latin typeface="Open Sans"/>
+                <a:ea typeface="Open Sans"/>
+                <a:cs typeface="Open Sans"/>
+              </a:rPr>
+              <a:t>HR management and employees</a:t>
             </a:r>
-            <a:endParaRPr sz="1700"/>
+            <a:r>
+              <a:rPr lang="en" sz="1600" b="0">
+                <a:latin typeface="Open Sans"/>
+                <a:ea typeface="Open Sans"/>
+                <a:cs typeface="Open Sans"/>
+              </a:rPr>
+              <a:t> </a:t>
+            </a:r>
+            <a:endParaRPr sz="1600" b="0"/>
           </a:p>
           <a:p>
             <a:pPr marL="457200" lvl="0" indent="0" algn="l">
@@ -26325,10 +26313,22 @@
               <a:t>User Access: </a:t>
             </a:r>
             <a:r>
-              <a:rPr lang="en" sz="1700"/>
-              <a:t>who will and will not have access to the data</a:t>
+              <a:rPr lang="en" sz="1400" b="0">
+                <a:latin typeface="Open Sans"/>
+                <a:ea typeface="Open Sans"/>
+                <a:cs typeface="Open Sans"/>
+              </a:rPr>
+              <a:t>employees have only read access to their own data. Employees don’t have access to salary data</a:t>
             </a:r>
-            <a:endParaRPr sz="1700"/>
+            <a:r>
+              <a:rPr lang="en" sz="1600" b="0">
+                <a:latin typeface="Open Sans"/>
+                <a:ea typeface="Open Sans"/>
+                <a:cs typeface="Open Sans"/>
+              </a:rPr>
+              <a:t>.</a:t>
+            </a:r>
+            <a:endParaRPr sz="1600" b="0"/>
           </a:p>
           <a:p>
             <a:pPr marL="457200" lvl="0" indent="0" algn="l">
@@ -26385,10 +26385,10 @@
               <a:defRPr/>
             </a:pPr>
             <a:r>
-              <a:rPr lang="en" sz="1900"/>
-              <a:t>Should replication or sharding be used to ensure scalability based on user needs</a:t>
+              <a:rPr lang="en" sz="1400"/>
+              <a:t>Current estimation is that there will be more of a read load and write, thus replication should be the initial strategy. But with the current data size, neither replication nor sharding is necessary. Scalability approaches can be applied when there’s a need for it. </a:t>
             </a:r>
-            <a:endParaRPr sz="1900"/>
+            <a:endParaRPr sz="1800"/>
           </a:p>
           <a:p>
             <a:pPr marL="457200" lvl="0" indent="-349250" algn="l">
@@ -26425,10 +26425,10 @@
               <a:defRPr/>
             </a:pPr>
             <a:r>
-              <a:rPr lang="en" sz="1900"/>
-              <a:t>Describe measures taken to ensure future data integration if needed</a:t>
+              <a:rPr lang="en" sz="1400"/>
+              <a:t>Data has been normalized to 3rd form, and security measures have been applied from the data modeling level. An application layer can easily sit in fron of this database and conumse data without having to do expensive queries. This eases further system integration.</a:t>
             </a:r>
-            <a:endParaRPr sz="1900"/>
+            <a:endParaRPr sz="1400"/>
           </a:p>
           <a:p>
             <a:pPr marL="457200" lvl="0" indent="-349250" algn="l">
@@ -26481,16 +26481,7 @@
             </a:r>
             <a:r>
               <a:rPr lang="en" sz="1700"/>
-              <a:t>check </a:t>
-            </a:r>
-            <a:r>
-              <a:rPr lang="en" sz="1700" u="sng">
-                <a:solidFill>
-                  <a:schemeClr val="hlink"/>
-                </a:solidFill>
-                <a:hlinkClick r:id="rId2" tooltip="https://drive.google.com/file/d/1YdBZPpaIQvnD9NbgkeLMb5PeFtnhGGRP/view?usp=sharing"/>
-              </a:rPr>
-              <a:t>IT best practices document</a:t>
+              <a:t>1GB on disk storage. </a:t>
             </a:r>
             <a:endParaRPr sz="1700"/>
           </a:p>
@@ -26534,24 +26525,8 @@
             </a:r>
             <a:r>
               <a:rPr lang="en" sz="1700"/>
-              <a:t>how long does the data have to be kept for?</a:t>
+              <a:t>7 years to comply with federal regulations</a:t>
             </a:r>
-            <a:endParaRPr sz="1700"/>
-          </a:p>
-          <a:p>
-            <a:pPr marL="457200" lvl="0" indent="0" algn="l">
-              <a:lnSpc>
-                <a:spcPct val="100000"/>
-              </a:lnSpc>
-              <a:spcBef>
-                <a:spcPts val="0"/>
-              </a:spcBef>
-              <a:spcAft>
-                <a:spcPts val="0"/>
-              </a:spcAft>
-              <a:buNone/>
-              <a:defRPr/>
-            </a:pPr>
             <a:endParaRPr sz="1700"/>
           </a:p>
           <a:p>
@@ -26609,23 +26584,10 @@
               <a:defRPr/>
             </a:pPr>
             <a:r>
-              <a:rPr lang="en" sz="1700"/>
-              <a:t> </a:t>
+              <a:rPr lang="en" sz="1400"/>
+              <a:t>Backup takes place based on priority: 1) standard backup is once per week, 2) archive backup is once per month, and 3) critical backup is once per week, and incremenetal backup daily.</a:t>
             </a:r>
-            <a:r>
-              <a:rPr lang="en" sz="1700" u="sng">
-                <a:solidFill>
-                  <a:schemeClr val="hlink"/>
-                </a:solidFill>
-                <a:hlinkClick r:id="rId2" tooltip="https://drive.google.com/file/d/1YdBZPpaIQvnD9NbgkeLMb5PeFtnhGGRP/view?usp=sharing"/>
-              </a:rPr>
-              <a:t>IT Best Practices document</a:t>
-            </a:r>
-            <a:r>
-              <a:rPr lang="en" sz="1700"/>
-              <a:t> lists Backup schedule requirements</a:t>
-            </a:r>
-            <a:endParaRPr sz="1700"/>
+            <a:endParaRPr sz="1400"/>
           </a:p>
           <a:p>
             <a:pPr marL="457200" lvl="0" indent="0" algn="l">

</xml_diff>

<commit_message>
responded to a security question in regards to employee salary
</commit_message>
<xml_diff>
--- a/starter-template (1).pptx
+++ b/starter-template (1).pptx
@@ -17255,7 +17255,7 @@
         </p:blipFill>
         <p:spPr bwMode="auto">
           <a:xfrm flipH="0" flipV="0">
-            <a:off x="1372972" y="5462669"/>
+            <a:off x="1304323" y="5462668"/>
             <a:ext cx="4909256" cy="4522954"/>
           </a:xfrm>
           <a:prstGeom prst="rect">
@@ -19054,7 +19054,7 @@
         </p:nvSpPr>
         <p:spPr bwMode="auto">
           <a:xfrm>
-            <a:off x="264950" y="2253724"/>
+            <a:off x="325832" y="1990170"/>
             <a:ext cx="7242600" cy="7731900"/>
           </a:xfrm>
           <a:prstGeom prst="rect">
@@ -19371,7 +19371,7 @@
       </p:sp>
       <p:pic>
         <p:nvPicPr>
-          <p:cNvPr id="1429990699" name=""/>
+          <p:cNvPr id="245878316" name=""/>
           <p:cNvPicPr>
             <a:picLocks noChangeAspect="1"/>
           </p:cNvPicPr>
@@ -19383,8 +19383,8 @@
         </p:blipFill>
         <p:spPr bwMode="auto">
           <a:xfrm flipH="0" flipV="0">
-            <a:off x="2698100" y="5277364"/>
-            <a:ext cx="2673779" cy="4708258"/>
+            <a:off x="2686416" y="4840566"/>
+            <a:ext cx="3395061" cy="5163575"/>
           </a:xfrm>
           <a:prstGeom prst="rect">
             <a:avLst/>
@@ -19738,34 +19738,24 @@
       </p:sp>
       <p:pic>
         <p:nvPicPr>
-          <p:cNvPr id="290" name="Google Shape;290;p68"/>
-          <p:cNvPicPr/>
+          <p:cNvPr id="1386115538" name=""/>
+          <p:cNvPicPr>
+            <a:picLocks noChangeAspect="1"/>
+          </p:cNvPicPr>
           <p:nvPr/>
         </p:nvPicPr>
         <p:blipFill>
-          <a:blip r:embed="rId2">
-            <a:alphaModFix/>
-          </a:blip>
+          <a:blip r:embed="rId2"/>
           <a:stretch/>
         </p:blipFill>
         <p:spPr bwMode="auto">
-          <a:xfrm>
-            <a:off x="1088175" y="4781750"/>
-            <a:ext cx="5036024" cy="3241700"/>
+          <a:xfrm flipH="0" flipV="0">
+            <a:off x="2362817" y="4437529"/>
+            <a:ext cx="2686164" cy="5505449"/>
           </a:xfrm>
           <a:prstGeom prst="rect">
             <a:avLst/>
           </a:prstGeom>
-          <a:noFill/>
-          <a:ln w="9525" cap="flat" cmpd="sng">
-            <a:solidFill>
-              <a:schemeClr val="dk2"/>
-            </a:solidFill>
-            <a:prstDash val="solid"/>
-            <a:round/>
-            <a:headEnd type="none" w="sm" len="sm"/>
-            <a:tailEnd type="none" w="sm" len="sm"/>
-          </a:ln>
         </p:spPr>
       </p:pic>
     </p:spTree>
@@ -20149,34 +20139,24 @@
       </p:sp>
       <p:pic>
         <p:nvPicPr>
-          <p:cNvPr id="297" name="Google Shape;297;p69"/>
-          <p:cNvPicPr/>
+          <p:cNvPr id="1315409342" name=""/>
+          <p:cNvPicPr>
+            <a:picLocks noChangeAspect="1"/>
+          </p:cNvPicPr>
           <p:nvPr/>
         </p:nvPicPr>
         <p:blipFill>
-          <a:blip r:embed="rId2">
-            <a:alphaModFix/>
-          </a:blip>
+          <a:blip r:embed="rId2"/>
           <a:stretch/>
         </p:blipFill>
         <p:spPr bwMode="auto">
           <a:xfrm>
-            <a:off x="1088175" y="4781750"/>
-            <a:ext cx="5036024" cy="3241700"/>
+            <a:off x="1827770" y="4891215"/>
+            <a:ext cx="3695699" cy="4219574"/>
           </a:xfrm>
           <a:prstGeom prst="rect">
             <a:avLst/>
           </a:prstGeom>
-          <a:noFill/>
-          <a:ln w="9525" cap="flat" cmpd="sng">
-            <a:solidFill>
-              <a:schemeClr val="dk2"/>
-            </a:solidFill>
-            <a:prstDash val="solid"/>
-            <a:round/>
-            <a:headEnd type="none" w="sm" len="sm"/>
-            <a:tailEnd type="none" w="sm" len="sm"/>
-          </a:ln>
         </p:spPr>
       </p:pic>
     </p:spTree>
@@ -20592,34 +20572,24 @@
       </p:sp>
       <p:pic>
         <p:nvPicPr>
-          <p:cNvPr id="304" name="Google Shape;304;p70"/>
-          <p:cNvPicPr/>
+          <p:cNvPr id="1056037320" name=""/>
+          <p:cNvPicPr>
+            <a:picLocks noChangeAspect="1"/>
+          </p:cNvPicPr>
           <p:nvPr/>
         </p:nvPicPr>
         <p:blipFill>
-          <a:blip r:embed="rId2">
-            <a:alphaModFix/>
-          </a:blip>
+          <a:blip r:embed="rId2"/>
           <a:stretch/>
         </p:blipFill>
         <p:spPr bwMode="auto">
-          <a:xfrm>
-            <a:off x="1088175" y="4781750"/>
-            <a:ext cx="5036024" cy="3241700"/>
+          <a:xfrm flipH="0" flipV="0">
+            <a:off x="1415878" y="4959864"/>
+            <a:ext cx="4729944" cy="4538190"/>
           </a:xfrm>
           <a:prstGeom prst="rect">
             <a:avLst/>
           </a:prstGeom>
-          <a:noFill/>
-          <a:ln w="9525" cap="flat" cmpd="sng">
-            <a:solidFill>
-              <a:schemeClr val="dk2"/>
-            </a:solidFill>
-            <a:prstDash val="solid"/>
-            <a:round/>
-            <a:headEnd type="none" w="sm" len="sm"/>
-            <a:tailEnd type="none" w="sm" len="sm"/>
-          </a:ln>
         </p:spPr>
       </p:pic>
     </p:spTree>
@@ -21640,34 +21610,24 @@
       </p:sp>
       <p:pic>
         <p:nvPicPr>
-          <p:cNvPr id="311" name="Google Shape;311;p71"/>
-          <p:cNvPicPr/>
+          <p:cNvPr id="634287170" name=""/>
+          <p:cNvPicPr>
+            <a:picLocks noChangeAspect="1"/>
+          </p:cNvPicPr>
           <p:nvPr/>
         </p:nvPicPr>
         <p:blipFill>
-          <a:blip r:embed="rId2">
-            <a:alphaModFix/>
-          </a:blip>
+          <a:blip r:embed="rId2"/>
           <a:stretch/>
         </p:blipFill>
         <p:spPr bwMode="auto">
           <a:xfrm>
-            <a:off x="1088175" y="4781750"/>
-            <a:ext cx="5036024" cy="3241700"/>
+            <a:off x="1321486" y="4676774"/>
+            <a:ext cx="4705349" cy="4676774"/>
           </a:xfrm>
           <a:prstGeom prst="rect">
             <a:avLst/>
           </a:prstGeom>
-          <a:noFill/>
-          <a:ln w="9525" cap="flat" cmpd="sng">
-            <a:solidFill>
-              <a:schemeClr val="dk2"/>
-            </a:solidFill>
-            <a:prstDash val="solid"/>
-            <a:round/>
-            <a:headEnd type="none" w="sm" len="sm"/>
-            <a:tailEnd type="none" w="sm" len="sm"/>
-          </a:ln>
         </p:spPr>
       </p:pic>
     </p:spTree>
@@ -22046,34 +22006,24 @@
       </p:sp>
       <p:pic>
         <p:nvPicPr>
-          <p:cNvPr id="318" name="Google Shape;318;p72"/>
-          <p:cNvPicPr/>
+          <p:cNvPr id="1258295581" name=""/>
+          <p:cNvPicPr>
+            <a:picLocks noChangeAspect="1"/>
+          </p:cNvPicPr>
           <p:nvPr/>
         </p:nvPicPr>
         <p:blipFill>
-          <a:blip r:embed="rId2">
-            <a:alphaModFix/>
-          </a:blip>
+          <a:blip r:embed="rId2"/>
           <a:stretch/>
         </p:blipFill>
         <p:spPr bwMode="auto">
-          <a:xfrm>
-            <a:off x="1088175" y="4781750"/>
-            <a:ext cx="5036024" cy="3241700"/>
+          <a:xfrm flipH="0" flipV="0">
+            <a:off x="1187532" y="4934091"/>
+            <a:ext cx="5272242" cy="4374008"/>
           </a:xfrm>
           <a:prstGeom prst="rect">
             <a:avLst/>
           </a:prstGeom>
-          <a:noFill/>
-          <a:ln w="9525" cap="flat" cmpd="sng">
-            <a:solidFill>
-              <a:schemeClr val="dk2"/>
-            </a:solidFill>
-            <a:prstDash val="solid"/>
-            <a:round/>
-            <a:headEnd type="none" w="sm" len="sm"/>
-            <a:tailEnd type="none" w="sm" len="sm"/>
-          </a:ln>
         </p:spPr>
       </p:pic>
     </p:spTree>
@@ -22449,34 +22399,24 @@
       </p:sp>
       <p:pic>
         <p:nvPicPr>
-          <p:cNvPr id="325" name="Google Shape;325;p73"/>
-          <p:cNvPicPr/>
+          <p:cNvPr id="1242692586" name=""/>
+          <p:cNvPicPr>
+            <a:picLocks noChangeAspect="1"/>
+          </p:cNvPicPr>
           <p:nvPr/>
         </p:nvPicPr>
         <p:blipFill>
-          <a:blip r:embed="rId2">
-            <a:alphaModFix/>
-          </a:blip>
+          <a:blip r:embed="rId2"/>
           <a:stretch/>
         </p:blipFill>
         <p:spPr bwMode="auto">
-          <a:xfrm>
-            <a:off x="1088175" y="4781750"/>
-            <a:ext cx="5036024" cy="3241700"/>
+          <a:xfrm flipH="0" flipV="0">
+            <a:off x="264949" y="5115370"/>
+            <a:ext cx="6908648" cy="3473159"/>
           </a:xfrm>
           <a:prstGeom prst="rect">
             <a:avLst/>
           </a:prstGeom>
-          <a:noFill/>
-          <a:ln w="9525" cap="flat" cmpd="sng">
-            <a:solidFill>
-              <a:schemeClr val="dk2"/>
-            </a:solidFill>
-            <a:prstDash val="solid"/>
-            <a:round/>
-            <a:headEnd type="none" w="sm" len="sm"/>
-            <a:tailEnd type="none" w="sm" len="sm"/>
-          </a:ln>
         </p:spPr>
       </p:pic>
     </p:spTree>
@@ -22669,6 +22609,10 @@
               <a:buNone/>
               <a:defRPr/>
             </a:pPr>
+            <a:r>
+              <a:rPr sz="1900"/>
+              <a:t>In order to restrict access to the employee salaries, I have modeled the database so that employee and salary are stored in separate tables. By doing this, the employee access could be given to relevant people without having to compromise salary data.</a:t>
+            </a:r>
             <a:endParaRPr sz="1900"/>
           </a:p>
           <a:p>

</xml_diff>

<commit_message>
written a view for the employee attributes
</commit_message>
<xml_diff>
--- a/starter-template (1).pptx
+++ b/starter-template (1).pptx
@@ -23204,6 +23204,28 @@
           </a:p>
         </p:txBody>
       </p:sp>
+      <p:pic>
+        <p:nvPicPr>
+          <p:cNvPr id="2066519852" name=""/>
+          <p:cNvPicPr>
+            <a:picLocks noChangeAspect="1"/>
+          </p:cNvPicPr>
+          <p:nvPr/>
+        </p:nvPicPr>
+        <p:blipFill>
+          <a:blip r:embed="rId2"/>
+          <a:stretch/>
+        </p:blipFill>
+        <p:spPr bwMode="auto">
+          <a:xfrm flipH="0" flipV="0">
+            <a:off x="119408" y="4384932"/>
+            <a:ext cx="7533682" cy="5463831"/>
+          </a:xfrm>
+          <a:prstGeom prst="rect">
+            <a:avLst/>
+          </a:prstGeom>
+        </p:spPr>
+      </p:pic>
     </p:spTree>
   </p:cSld>
   <p:clrMapOvr>

</xml_diff>

<commit_message>
added privileges, stored proceudres and views
</commit_message>
<xml_diff>
--- a/starter-template (1).pptx
+++ b/starter-template (1).pptx
@@ -23400,6 +23400,28 @@
           </a:p>
         </p:txBody>
       </p:sp>
+      <p:pic>
+        <p:nvPicPr>
+          <p:cNvPr id="1443666183" name=""/>
+          <p:cNvPicPr>
+            <a:picLocks noChangeAspect="1"/>
+          </p:cNvPicPr>
+          <p:nvPr/>
+        </p:nvPicPr>
+        <p:blipFill>
+          <a:blip r:embed="rId2"/>
+          <a:stretch/>
+        </p:blipFill>
+        <p:spPr bwMode="auto">
+          <a:xfrm flipH="0" flipV="0">
+            <a:off x="646447" y="5289464"/>
+            <a:ext cx="6479594" cy="4188510"/>
+          </a:xfrm>
+          <a:prstGeom prst="rect">
+            <a:avLst/>
+          </a:prstGeom>
+        </p:spPr>
+      </p:pic>
     </p:spTree>
   </p:cSld>
   <p:clrMapOvr>
@@ -23616,6 +23638,28 @@
           </a:p>
         </p:txBody>
       </p:sp>
+      <p:pic>
+        <p:nvPicPr>
+          <p:cNvPr id="82765595" name=""/>
+          <p:cNvPicPr>
+            <a:picLocks noChangeAspect="1"/>
+          </p:cNvPicPr>
+          <p:nvPr/>
+        </p:nvPicPr>
+        <p:blipFill>
+          <a:blip r:embed="rId2"/>
+          <a:stretch/>
+        </p:blipFill>
+        <p:spPr bwMode="auto">
+          <a:xfrm>
+            <a:off x="626418" y="5577702"/>
+            <a:ext cx="6372225" cy="2428875"/>
+          </a:xfrm>
+          <a:prstGeom prst="rect">
+            <a:avLst/>
+          </a:prstGeom>
+        </p:spPr>
+      </p:pic>
     </p:spTree>
   </p:cSld>
   <p:clrMapOvr>
@@ -24163,7 +24207,7 @@
             </a:pPr>
             <a:r>
               <a:rPr lang="en" sz="3100"/>
-              <a:t>You can include supporting or additional information that supports your previous slides, but isn’t necessary for every person to see that looks at your slides.</a:t>
+              <a:t>Stored Procedures are only supported in Postgress after version 10. The version that currently runs on the web sandbox is 9. Therefore I did not check if the stored procedure code works. </a:t>
             </a:r>
             <a:endParaRPr sz="3100"/>
           </a:p>
@@ -25158,7 +25202,7 @@
             </a:pPr>
             <a:r>
               <a:rPr lang="en" sz="1400"/>
-              <a:t>Purpose of the new database is to facilitate the growth of the company and help HR employees and management easily scale and maintain the data related to employees.  </a:t>
+              <a:t>The purpose of the new database is to facilitate the growth of the company and help HR employees and management easily scale and maintain the data related to employees.  </a:t>
             </a:r>
             <a:endParaRPr sz="1600"/>
           </a:p>
@@ -25939,7 +25983,7 @@
             </a:pPr>
             <a:r>
               <a:rPr lang="en" sz="1700"/>
-              <a:t>Underlying current approaches data integrity and data security can be compromised. This is due to the fact that sharing spreadsheets opens up a lot of opportunity for mistakes, which introduces security risk. If the wrong person gets access to this data, they can see all employee details and their salaries. </a:t>
+              <a:t>Underlying current approaches data integrity and data security can be compromised. This is due to the fact that sharing spreadsheets opens up a lot of opportunity for mistakes, which introduces security risks. If the wrong person gets access to this data, they can see all employee details and their salaries. </a:t>
             </a:r>
             <a:endParaRPr lang="en" sz="1700"/>
           </a:p>
@@ -26011,7 +26055,7 @@
             </a:pPr>
             <a:r>
               <a:rPr lang="en" sz="1700"/>
-              <a:t>List of database tables that will be created for this project: 1) Employee, 2) Manager, 3) Education_Level, 4) Office, 5) City, 6) Job, 7) Salary, 8) Employee_History, 9) Department</a:t>
+              <a:t>List of database tables that will be created for this project: 1) Employee, 2) Education_Level, 3) Office, 4) City, 5) Job, 6) Salary, 7) Employee_History, 8) Department</a:t>
             </a:r>
             <a:endParaRPr sz="1700"/>
           </a:p>
@@ -26063,7 +26107,7 @@
             </a:pPr>
             <a:r>
               <a:rPr lang="en" sz="1700"/>
-              <a:t>API is a chosen method for interfacing with the payroll management system. APIs provide with clearly defined interfaces and establishesh concrete system boundaries.</a:t>
+              <a:t>API is a chosen method for interfacing with the payroll management system. APIs provide with clearly defined endpoints and establish concrete system boundaries.</a:t>
             </a:r>
             <a:endParaRPr sz="1900"/>
           </a:p>
@@ -26352,7 +26396,7 @@
             </a:pPr>
             <a:r>
               <a:rPr lang="en" sz="1400"/>
-              <a:t>Current estimation is that there will be more of a read load and write, thus replication should be the initial strategy. But with the current data size, neither replication nor sharding is necessary. Scalability approaches can be applied when there’s a need for it. </a:t>
+              <a:t>Current estimation is that there will be more of a read load than write, thus replication should be the initial strategy. But with the current data size, neither replication nor sharding is necessary. Scalability approaches can be applied when there’s a need for it. </a:t>
             </a:r>
             <a:endParaRPr sz="1800"/>
           </a:p>

</xml_diff>